<commit_message>
Lille update til figur
</commit_message>
<xml_diff>
--- a/Writing/Thesis_Figures/FAOR Free Energy Diagram.pptx
+++ b/Writing/Thesis_Figures/FAOR Free Energy Diagram.pptx
@@ -680,6 +680,15 @@
             <a:r>
               <a:rPr lang="da-DK" dirty="0"/>
               <a:t>.</a:t>
+            </a:r>
+          </a:p>
+          <a:p>
+            <a:endParaRPr lang="da-DK" dirty="0"/>
+          </a:p>
+          <a:p>
+            <a:r>
+              <a:rPr lang="da-DK" dirty="0"/>
+              <a:t>Det laveste potentiale, hvor det går ned ad bakke</a:t>
             </a:r>
           </a:p>
         </p:txBody>
@@ -6883,8 +6892,8 @@
         </p:nvCxnSpPr>
         <p:spPr>
           <a:xfrm flipV="1">
-            <a:off x="2776254" y="3703001"/>
-            <a:ext cx="0" cy="597214"/>
+            <a:off x="2776254" y="4089456"/>
+            <a:ext cx="0" cy="210759"/>
           </a:xfrm>
           <a:prstGeom prst="straightConnector1">
             <a:avLst/>
@@ -7025,9 +7034,9 @@
           <p:nvPr/>
         </p:nvCxnSpPr>
         <p:spPr>
-          <a:xfrm flipH="1" flipV="1">
-            <a:off x="4381027" y="3324186"/>
-            <a:ext cx="563" cy="1248258"/>
+          <a:xfrm flipV="1">
+            <a:off x="4381590" y="4089456"/>
+            <a:ext cx="0" cy="482988"/>
           </a:xfrm>
           <a:prstGeom prst="straightConnector1">
             <a:avLst/>
@@ -7159,50 +7168,6 @@
           </p:sp>
         </mc:Fallback>
       </mc:AlternateContent>
-      <p:cxnSp>
-        <p:nvCxnSpPr>
-          <p:cNvPr id="87" name="Straight Connector 86">
-            <a:extLst>
-              <a:ext uri="{FF2B5EF4-FFF2-40B4-BE49-F238E27FC236}">
-                <a16:creationId xmlns:a16="http://schemas.microsoft.com/office/drawing/2014/main" id="{7CE752EA-F3FF-647F-694A-A8A6436AC8E7}"/>
-              </a:ext>
-            </a:extLst>
-          </p:cNvPr>
-          <p:cNvCxnSpPr>
-            <a:cxnSpLocks/>
-          </p:cNvCxnSpPr>
-          <p:nvPr/>
-        </p:nvCxnSpPr>
-        <p:spPr>
-          <a:xfrm>
-            <a:off x="2479055" y="3660462"/>
-            <a:ext cx="623389" cy="0"/>
-          </a:xfrm>
-          <a:prstGeom prst="line">
-            <a:avLst/>
-          </a:prstGeom>
-          <a:ln w="12700">
-            <a:solidFill>
-              <a:srgbClr val="FF7300"/>
-            </a:solidFill>
-            <a:prstDash val="dash"/>
-          </a:ln>
-        </p:spPr>
-        <p:style>
-          <a:lnRef idx="1">
-            <a:schemeClr val="accent1"/>
-          </a:lnRef>
-          <a:fillRef idx="0">
-            <a:schemeClr val="accent1"/>
-          </a:fillRef>
-          <a:effectRef idx="0">
-            <a:schemeClr val="accent1"/>
-          </a:effectRef>
-          <a:fontRef idx="minor">
-            <a:schemeClr val="tx1"/>
-          </a:fontRef>
-        </p:style>
-      </p:cxnSp>
       <p:cxnSp>
         <p:nvCxnSpPr>
           <p:cNvPr id="88" name="Straight Connector 87">
@@ -9175,8 +9140,8 @@
         </p:nvCxnSpPr>
         <p:spPr>
           <a:xfrm>
-            <a:off x="3312074" y="3279207"/>
-            <a:ext cx="0" cy="381255"/>
+            <a:off x="3903774" y="3249676"/>
+            <a:ext cx="0" cy="759988"/>
           </a:xfrm>
           <a:prstGeom prst="straightConnector1">
             <a:avLst/>
@@ -9218,8 +9183,8 @@
         </p:nvSpPr>
         <p:spPr>
           <a:xfrm>
-            <a:off x="3315949" y="3240403"/>
-            <a:ext cx="707270" cy="430887"/>
+            <a:off x="3385445" y="3465696"/>
+            <a:ext cx="1036659" cy="261610"/>
           </a:xfrm>
           <a:prstGeom prst="rect">
             <a:avLst/>
@@ -9233,16 +9198,6 @@
           <a:lstStyle/>
           <a:p>
             <a:r>
-              <a:rPr lang="da-DK" sz="1100" dirty="0" err="1">
-                <a:solidFill>
-                  <a:srgbClr val="FF0000"/>
-                </a:solidFill>
-                <a:latin typeface="Times New Roman" panose="02020603050405020304" pitchFamily="18" charset="0"/>
-                <a:cs typeface="Times New Roman" panose="02020603050405020304" pitchFamily="18" charset="0"/>
-              </a:rPr>
-              <a:t>Smth</a:t>
-            </a:r>
-            <a:r>
               <a:rPr lang="da-DK" sz="1100" dirty="0">
                 <a:solidFill>
                   <a:srgbClr val="FF0000"/>
@@ -9250,7 +9205,7 @@
                 <a:latin typeface="Times New Roman" panose="02020603050405020304" pitchFamily="18" charset="0"/>
                 <a:cs typeface="Times New Roman" panose="02020603050405020304" pitchFamily="18" charset="0"/>
               </a:rPr>
-              <a:t> bad</a:t>
+              <a:t>Overpotentiale</a:t>
             </a:r>
           </a:p>
         </p:txBody>

</xml_diff>

<commit_message>
Improved two figures and wrote 200 words about FAOR
</commit_message>
<xml_diff>
--- a/Writing/Thesis_Figures/FAOR Free Energy Diagram.pptx
+++ b/Writing/Thesis_Figures/FAOR Free Energy Diagram.pptx
@@ -689,6 +689,42 @@
             <a:r>
               <a:rPr lang="da-DK" dirty="0"/>
               <a:t>Det laveste potentiale, hvor det går ned ad bakke</a:t>
+            </a:r>
+          </a:p>
+          <a:p>
+            <a:endParaRPr lang="da-DK" dirty="0"/>
+          </a:p>
+          <a:p>
+            <a:r>
+              <a:rPr lang="da-DK" dirty="0"/>
+              <a:t>Figurtekst:</a:t>
+            </a:r>
+          </a:p>
+          <a:p>
+            <a:endParaRPr lang="da-DK" dirty="0"/>
+          </a:p>
+          <a:p>
+            <a:r>
+              <a:rPr lang="da-DK" dirty="0"/>
+              <a:t>Bold streger er Gibbs </a:t>
+            </a:r>
+            <a:r>
+              <a:rPr lang="da-DK" dirty="0" err="1"/>
+              <a:t>Free</a:t>
+            </a:r>
+            <a:r>
+              <a:rPr lang="da-DK" dirty="0"/>
+              <a:t> Energies før potentialet er lagt til med CHE</a:t>
+            </a:r>
+          </a:p>
+          <a:p>
+            <a:r>
+              <a:rPr lang="da-DK" dirty="0" err="1"/>
+              <a:t>Dashed</a:t>
+            </a:r>
+            <a:r>
+              <a:rPr lang="da-DK" dirty="0"/>
+              <a:t> er inklusivt</a:t>
             </a:r>
           </a:p>
         </p:txBody>
@@ -3602,7 +3638,7 @@
         </p:nvSpPr>
         <p:spPr>
           <a:xfrm>
-            <a:off x="623776" y="301427"/>
+            <a:off x="715921" y="301427"/>
             <a:ext cx="4359349" cy="1899684"/>
           </a:xfrm>
           <a:prstGeom prst="rect">
@@ -3657,8 +3693,8 @@
             </p:nvSpPr>
             <p:spPr>
               <a:xfrm rot="16200000">
-                <a:off x="336243" y="1166631"/>
-                <a:ext cx="213007" cy="169277"/>
+                <a:off x="143760" y="1176631"/>
+                <a:ext cx="505395" cy="169277"/>
               </a:xfrm>
               <a:prstGeom prst="rect">
                 <a:avLst/>
@@ -3672,33 +3708,56 @@
               <a:lstStyle/>
               <a:p>
                 <a14:m>
-                  <m:oMathPara xmlns:m="http://schemas.openxmlformats.org/officeDocument/2006/math">
-                    <m:oMathParaPr>
-                      <m:jc m:val="centerGroup"/>
-                    </m:oMathParaPr>
-                    <m:oMath xmlns:m="http://schemas.openxmlformats.org/officeDocument/2006/math">
-                      <m:r>
-                        <m:rPr>
-                          <m:sty m:val="p"/>
-                        </m:rPr>
-                        <a:rPr lang="da-DK" sz="1100">
-                          <a:latin typeface="Cambria Math" panose="02040503050406030204" pitchFamily="18" charset="0"/>
-                        </a:rPr>
-                        <m:t>Δ</m:t>
-                      </m:r>
-                      <m:r>
-                        <a:rPr lang="da-DK" sz="1100" i="1">
-                          <a:latin typeface="Cambria Math" panose="02040503050406030204" pitchFamily="18" charset="0"/>
-                        </a:rPr>
-                        <m:t>𝐺</m:t>
-                      </m:r>
-                    </m:oMath>
-                  </m:oMathPara>
+                  <m:oMath xmlns:m="http://schemas.openxmlformats.org/officeDocument/2006/math">
+                    <m:r>
+                      <m:rPr>
+                        <m:sty m:val="p"/>
+                      </m:rPr>
+                      <a:rPr lang="da-DK" sz="1100" smtClean="0">
+                        <a:latin typeface="Cambria Math" panose="02040503050406030204" pitchFamily="18" charset="0"/>
+                      </a:rPr>
+                      <m:t>Δ</m:t>
+                    </m:r>
+                    <m:r>
+                      <a:rPr lang="da-DK" sz="1100" i="1">
+                        <a:latin typeface="Cambria Math" panose="02040503050406030204" pitchFamily="18" charset="0"/>
+                      </a:rPr>
+                      <m:t>𝐺</m:t>
+                    </m:r>
+                    <m:r>
+                      <a:rPr lang="da-DK" sz="1100" b="0" i="1" smtClean="0">
+                        <a:latin typeface="Cambria Math" panose="02040503050406030204" pitchFamily="18" charset="0"/>
+                      </a:rPr>
+                      <m:t> </m:t>
+                    </m:r>
+                    <m:d>
+                      <m:dPr>
+                        <m:begChr m:val="["/>
+                        <m:endChr m:val="]"/>
+                        <m:ctrlPr>
+                          <a:rPr lang="da-DK" sz="1100" b="0" i="1" smtClean="0">
+                            <a:latin typeface="Cambria Math" panose="02040503050406030204" pitchFamily="18" charset="0"/>
+                          </a:rPr>
+                        </m:ctrlPr>
+                      </m:dPr>
+                      <m:e>
+                        <m:r>
+                          <a:rPr lang="da-DK" sz="1100" b="0" i="1" smtClean="0">
+                            <a:latin typeface="Cambria Math" panose="02040503050406030204" pitchFamily="18" charset="0"/>
+                          </a:rPr>
+                          <m:t>𝑒𝑉</m:t>
+                        </m:r>
+                      </m:e>
+                    </m:d>
+                  </m:oMath>
                 </a14:m>
-                <a:endParaRPr lang="da-DK" sz="1100" dirty="0">
-                  <a:latin typeface="Times New Roman" panose="02020603050405020304" pitchFamily="18" charset="0"/>
-                  <a:cs typeface="Times New Roman" panose="02020603050405020304" pitchFamily="18" charset="0"/>
-                </a:endParaRPr>
+                <a:r>
+                  <a:rPr lang="da-DK" sz="1100" dirty="0">
+                    <a:latin typeface="Times New Roman" panose="02020603050405020304" pitchFamily="18" charset="0"/>
+                    <a:cs typeface="Times New Roman" panose="02020603050405020304" pitchFamily="18" charset="0"/>
+                  </a:rPr>
+                  <a:t> </a:t>
+                </a:r>
               </a:p>
             </p:txBody>
           </p:sp>
@@ -3720,8 +3779,8 @@
             </p:nvSpPr>
             <p:spPr>
               <a:xfrm rot="16200000">
-                <a:off x="336243" y="1166631"/>
-                <a:ext cx="213007" cy="169277"/>
+                <a:off x="143760" y="1176631"/>
+                <a:ext cx="505395" cy="169277"/>
               </a:xfrm>
               <a:prstGeom prst="rect">
                 <a:avLst/>
@@ -3729,7 +3788,7 @@
               <a:blipFill>
                 <a:blip r:embed="rId3"/>
                 <a:stretch>
-                  <a:fillRect t="-11111" r="-7143" b="-11111"/>
+                  <a:fillRect r="-42857" b="-7317"/>
                 </a:stretch>
               </a:blipFill>
             </p:spPr>
@@ -3764,7 +3823,7 @@
             </p:nvSpPr>
             <p:spPr>
               <a:xfrm>
-                <a:off x="942753" y="2274772"/>
+                <a:off x="1034898" y="2274772"/>
                 <a:ext cx="517065" cy="169277"/>
               </a:xfrm>
               <a:prstGeom prst="rect">
@@ -3818,7 +3877,7 @@
             </p:nvSpPr>
             <p:spPr>
               <a:xfrm>
-                <a:off x="942753" y="2274772"/>
+                <a:off x="1034898" y="2274772"/>
                 <a:ext cx="517065" cy="169277"/>
               </a:xfrm>
               <a:prstGeom prst="rect">
@@ -3827,7 +3886,7 @@
               <a:blipFill>
                 <a:blip r:embed="rId4"/>
                 <a:stretch>
-                  <a:fillRect l="-4878" r="-4878" b="-7143"/>
+                  <a:fillRect l="-4762" r="-4762" b="-7143"/>
                 </a:stretch>
               </a:blipFill>
             </p:spPr>
@@ -3862,7 +3921,7 @@
             </p:nvSpPr>
             <p:spPr>
               <a:xfrm>
-                <a:off x="2160306" y="2274772"/>
+                <a:off x="2252451" y="2274772"/>
                 <a:ext cx="1260951" cy="169277"/>
               </a:xfrm>
               <a:prstGeom prst="rect">
@@ -4009,7 +4068,7 @@
             </p:nvSpPr>
             <p:spPr>
               <a:xfrm>
-                <a:off x="2160306" y="2274772"/>
+                <a:off x="2252451" y="2274772"/>
                 <a:ext cx="1260951" cy="169277"/>
               </a:xfrm>
               <a:prstGeom prst="rect">
@@ -4018,7 +4077,7 @@
               <a:blipFill>
                 <a:blip r:embed="rId5"/>
                 <a:stretch>
-                  <a:fillRect l="-1980" r="-3960" b="-35714"/>
+                  <a:fillRect l="-3000" r="-4000" b="-35714"/>
                 </a:stretch>
               </a:blipFill>
             </p:spPr>
@@ -4053,7 +4112,7 @@
             </p:nvSpPr>
             <p:spPr>
               <a:xfrm>
-                <a:off x="3802184" y="2274772"/>
+                <a:off x="3894329" y="2274772"/>
                 <a:ext cx="1159676" cy="169277"/>
               </a:xfrm>
               <a:prstGeom prst="rect">
@@ -4200,7 +4259,7 @@
             </p:nvSpPr>
             <p:spPr>
               <a:xfrm>
-                <a:off x="3802184" y="2274772"/>
+                <a:off x="3894329" y="2274772"/>
                 <a:ext cx="1159676" cy="169277"/>
               </a:xfrm>
               <a:prstGeom prst="rect">
@@ -4244,7 +4303,7 @@
         </p:nvCxnSpPr>
         <p:spPr>
           <a:xfrm flipV="1">
-            <a:off x="1197738" y="2115205"/>
+            <a:off x="1289883" y="2115205"/>
             <a:ext cx="0" cy="85906"/>
           </a:xfrm>
           <a:prstGeom prst="line">
@@ -4287,7 +4346,7 @@
         </p:nvCxnSpPr>
         <p:spPr>
           <a:xfrm flipV="1">
-            <a:off x="2790751" y="2111662"/>
+            <a:off x="2882896" y="2111662"/>
             <a:ext cx="0" cy="85906"/>
           </a:xfrm>
           <a:prstGeom prst="line">
@@ -4330,7 +4389,7 @@
         </p:nvCxnSpPr>
         <p:spPr>
           <a:xfrm flipV="1">
-            <a:off x="4383763" y="2115206"/>
+            <a:off x="4475908" y="2115206"/>
             <a:ext cx="0" cy="85906"/>
           </a:xfrm>
           <a:prstGeom prst="line">
@@ -4357,42 +4416,6 @@
           </a:fontRef>
         </p:style>
       </p:cxnSp>
-      <p:pic>
-        <p:nvPicPr>
-          <p:cNvPr id="17" name="Picture 16" descr="A screenshot of a white sheet&#10;&#10;Description automatically generated">
-            <a:extLst>
-              <a:ext uri="{FF2B5EF4-FFF2-40B4-BE49-F238E27FC236}">
-                <a16:creationId xmlns:a16="http://schemas.microsoft.com/office/drawing/2014/main" id="{786E750D-8BFC-C520-DA5F-5BDD406E4ACA}"/>
-              </a:ext>
-            </a:extLst>
-          </p:cNvPr>
-          <p:cNvPicPr>
-            <a:picLocks noChangeAspect="1"/>
-          </p:cNvPicPr>
-          <p:nvPr/>
-        </p:nvPicPr>
-        <p:blipFill>
-          <a:blip r:embed="rId7" cstate="print">
-            <a:extLst>
-              <a:ext uri="{28A0092B-C50C-407E-A947-70E740481C1C}">
-                <a14:useLocalDpi xmlns:a14="http://schemas.microsoft.com/office/drawing/2010/main" val="0"/>
-              </a:ext>
-            </a:extLst>
-          </a:blip>
-          <a:stretch>
-            <a:fillRect/>
-          </a:stretch>
-        </p:blipFill>
-        <p:spPr>
-          <a:xfrm>
-            <a:off x="6470807" y="6641453"/>
-            <a:ext cx="3199673" cy="2256299"/>
-          </a:xfrm>
-          <a:prstGeom prst="rect">
-            <a:avLst/>
-          </a:prstGeom>
-        </p:spPr>
-      </p:pic>
       <p:cxnSp>
         <p:nvCxnSpPr>
           <p:cNvPr id="19" name="Straight Connector 18">
@@ -4409,7 +4432,7 @@
         </p:nvCxnSpPr>
         <p:spPr>
           <a:xfrm>
-            <a:off x="886044" y="596734"/>
+            <a:off x="978189" y="596734"/>
             <a:ext cx="623389" cy="0"/>
           </a:xfrm>
           <a:prstGeom prst="line">
@@ -4452,7 +4475,7 @@
         </p:nvCxnSpPr>
         <p:spPr>
           <a:xfrm>
-            <a:off x="2479057" y="1296710"/>
+            <a:off x="2571202" y="1296710"/>
             <a:ext cx="623389" cy="0"/>
           </a:xfrm>
           <a:prstGeom prst="line">
@@ -4495,7 +4518,7 @@
         </p:nvCxnSpPr>
         <p:spPr>
           <a:xfrm>
-            <a:off x="4047059" y="1968328"/>
+            <a:off x="4139204" y="1968328"/>
             <a:ext cx="623389" cy="0"/>
           </a:xfrm>
           <a:prstGeom prst="line">
@@ -4522,165 +4545,6 @@
           </a:fontRef>
         </p:style>
       </p:cxnSp>
-      <mc:AlternateContent xmlns:mc="http://schemas.openxmlformats.org/markup-compatibility/2006">
-        <mc:Choice xmlns:a14="http://schemas.microsoft.com/office/drawing/2010/main" Requires="a14">
-          <p:sp>
-            <p:nvSpPr>
-              <p:cNvPr id="23" name="TextBox 22">
-                <a:extLst>
-                  <a:ext uri="{FF2B5EF4-FFF2-40B4-BE49-F238E27FC236}">
-                    <a16:creationId xmlns:a16="http://schemas.microsoft.com/office/drawing/2014/main" id="{AA743557-C62F-053B-6A1B-FDEA70CFE358}"/>
-                  </a:ext>
-                </a:extLst>
-              </p:cNvPr>
-              <p:cNvSpPr txBox="1"/>
-              <p:nvPr/>
-            </p:nvSpPr>
-            <p:spPr>
-              <a:xfrm>
-                <a:off x="2363695" y="1278621"/>
-                <a:ext cx="821443" cy="304699"/>
-              </a:xfrm>
-              <a:prstGeom prst="rect">
-                <a:avLst/>
-              </a:prstGeom>
-              <a:noFill/>
-            </p:spPr>
-            <p:txBody>
-              <a:bodyPr wrap="none" rtlCol="0">
-                <a:spAutoFit/>
-              </a:bodyPr>
-              <a:lstStyle/>
-              <a:p>
-                <a14:m>
-                  <m:oMathPara xmlns:m="http://schemas.openxmlformats.org/officeDocument/2006/math">
-                    <m:oMathParaPr>
-                      <m:jc m:val="centerGroup"/>
-                    </m:oMathParaPr>
-                    <m:oMath xmlns:m="http://schemas.openxmlformats.org/officeDocument/2006/math">
-                      <m:r>
-                        <m:rPr>
-                          <m:sty m:val="p"/>
-                        </m:rPr>
-                        <a:rPr lang="da-DK" sz="1100">
-                          <a:latin typeface="Cambria Math" panose="02040503050406030204" pitchFamily="18" charset="0"/>
-                        </a:rPr>
-                        <m:t>Δ</m:t>
-                      </m:r>
-                      <m:sSubSup>
-                        <m:sSubSupPr>
-                          <m:ctrlPr>
-                            <a:rPr lang="da-DK" sz="1100" i="1">
-                              <a:latin typeface="Cambria Math" panose="02040503050406030204" pitchFamily="18" charset="0"/>
-                            </a:rPr>
-                          </m:ctrlPr>
-                        </m:sSubSupPr>
-                        <m:e>
-                          <m:r>
-                            <a:rPr lang="da-DK" sz="1100" i="1">
-                              <a:latin typeface="Cambria Math" panose="02040503050406030204" pitchFamily="18" charset="0"/>
-                            </a:rPr>
-                            <m:t>𝐺</m:t>
-                          </m:r>
-                        </m:e>
-                        <m:sub>
-                          <m:r>
-                            <a:rPr lang="da-DK" sz="1100" i="1">
-                              <a:latin typeface="Cambria Math" panose="02040503050406030204" pitchFamily="18" charset="0"/>
-                            </a:rPr>
-                            <m:t>𝐶𝑂𝑂</m:t>
-                          </m:r>
-                          <m:sSup>
-                            <m:sSupPr>
-                              <m:ctrlPr>
-                                <a:rPr lang="da-DK" sz="1100" i="1">
-                                  <a:latin typeface="Cambria Math" panose="02040503050406030204" pitchFamily="18" charset="0"/>
-                                </a:rPr>
-                              </m:ctrlPr>
-                            </m:sSupPr>
-                            <m:e>
-                              <m:r>
-                                <a:rPr lang="da-DK" sz="1100" i="1">
-                                  <a:latin typeface="Cambria Math" panose="02040503050406030204" pitchFamily="18" charset="0"/>
-                                </a:rPr>
-                                <m:t>𝐻</m:t>
-                              </m:r>
-                            </m:e>
-                            <m:sup>
-                              <m:r>
-                                <a:rPr lang="da-DK" sz="1100" i="1">
-                                  <a:latin typeface="Cambria Math" panose="02040503050406030204" pitchFamily="18" charset="0"/>
-                                </a:rPr>
-                                <m:t>∗</m:t>
-                              </m:r>
-                            </m:sup>
-                          </m:sSup>
-                        </m:sub>
-                        <m:sup>
-                          <m:r>
-                            <a:rPr lang="da-DK" sz="1100" i="1">
-                              <a:latin typeface="Cambria Math" panose="02040503050406030204" pitchFamily="18" charset="0"/>
-                            </a:rPr>
-                            <m:t>𝑂𝑝𝑡𝑖𝑚𝑎𝑙</m:t>
-                          </m:r>
-                        </m:sup>
-                      </m:sSubSup>
-                    </m:oMath>
-                  </m:oMathPara>
-                </a14:m>
-                <a:endParaRPr lang="da-DK" sz="1100" dirty="0">
-                  <a:latin typeface="Times New Roman" panose="02020603050405020304" pitchFamily="18" charset="0"/>
-                  <a:cs typeface="Times New Roman" panose="02020603050405020304" pitchFamily="18" charset="0"/>
-                </a:endParaRPr>
-              </a:p>
-            </p:txBody>
-          </p:sp>
-        </mc:Choice>
-        <mc:Fallback>
-          <p:sp>
-            <p:nvSpPr>
-              <p:cNvPr id="23" name="TextBox 22">
-                <a:extLst>
-                  <a:ext uri="{FF2B5EF4-FFF2-40B4-BE49-F238E27FC236}">
-                    <a16:creationId xmlns:a16="http://schemas.microsoft.com/office/drawing/2014/main" id="{AA743557-C62F-053B-6A1B-FDEA70CFE358}"/>
-                  </a:ext>
-                </a:extLst>
-              </p:cNvPr>
-              <p:cNvSpPr txBox="1">
-                <a:spLocks noRot="1" noChangeAspect="1" noMove="1" noResize="1" noEditPoints="1" noAdjustHandles="1" noChangeArrowheads="1" noChangeShapeType="1" noTextEdit="1"/>
-              </p:cNvSpPr>
-              <p:nvPr/>
-            </p:nvSpPr>
-            <p:spPr>
-              <a:xfrm>
-                <a:off x="2363695" y="1278621"/>
-                <a:ext cx="821443" cy="304699"/>
-              </a:xfrm>
-              <a:prstGeom prst="rect">
-                <a:avLst/>
-              </a:prstGeom>
-              <a:blipFill>
-                <a:blip r:embed="rId8"/>
-                <a:stretch>
-                  <a:fillRect/>
-                </a:stretch>
-              </a:blipFill>
-            </p:spPr>
-            <p:txBody>
-              <a:bodyPr/>
-              <a:lstStyle/>
-              <a:p>
-                <a:r>
-                  <a:rPr lang="da-DK">
-                    <a:noFill/>
-                  </a:rPr>
-                  <a:t> </a:t>
-                </a:r>
-              </a:p>
-            </p:txBody>
-          </p:sp>
-        </mc:Fallback>
-      </mc:AlternateContent>
       <p:cxnSp>
         <p:nvCxnSpPr>
           <p:cNvPr id="24" name="Straight Connector 23">
@@ -4697,7 +4561,7 @@
         </p:nvCxnSpPr>
         <p:spPr>
           <a:xfrm>
-            <a:off x="2479055" y="598295"/>
+            <a:off x="2571200" y="598295"/>
             <a:ext cx="623389" cy="0"/>
           </a:xfrm>
           <a:prstGeom prst="line">
@@ -4741,7 +4605,7 @@
         </p:nvCxnSpPr>
         <p:spPr>
           <a:xfrm>
-            <a:off x="4047059" y="598294"/>
+            <a:off x="4139204" y="598294"/>
             <a:ext cx="623389" cy="0"/>
           </a:xfrm>
           <a:prstGeom prst="line">
@@ -4769,108 +4633,6 @@
           </a:fontRef>
         </p:style>
       </p:cxnSp>
-      <mc:AlternateContent xmlns:mc="http://schemas.openxmlformats.org/markup-compatibility/2006">
-        <mc:Choice xmlns:a14="http://schemas.microsoft.com/office/drawing/2010/main" Requires="a14">
-          <p:sp>
-            <p:nvSpPr>
-              <p:cNvPr id="40" name="TextBox 39">
-                <a:extLst>
-                  <a:ext uri="{FF2B5EF4-FFF2-40B4-BE49-F238E27FC236}">
-                    <a16:creationId xmlns:a16="http://schemas.microsoft.com/office/drawing/2014/main" id="{239A900E-0992-9AC8-E407-8D529B06058F}"/>
-                  </a:ext>
-                </a:extLst>
-              </p:cNvPr>
-              <p:cNvSpPr txBox="1"/>
-              <p:nvPr/>
-            </p:nvSpPr>
-            <p:spPr>
-              <a:xfrm>
-                <a:off x="4924403" y="2447844"/>
-                <a:ext cx="900888" cy="261610"/>
-              </a:xfrm>
-              <a:prstGeom prst="rect">
-                <a:avLst/>
-              </a:prstGeom>
-              <a:noFill/>
-            </p:spPr>
-            <p:txBody>
-              <a:bodyPr wrap="none" rtlCol="0">
-                <a:spAutoFit/>
-              </a:bodyPr>
-              <a:lstStyle/>
-              <a:p>
-                <a14:m>
-                  <m:oMath xmlns:m="http://schemas.openxmlformats.org/officeDocument/2006/math">
-                    <m:r>
-                      <a:rPr lang="da-DK" sz="1100" i="1" dirty="0">
-                        <a:latin typeface="Cambria Math" panose="02040503050406030204" pitchFamily="18" charset="0"/>
-                      </a:rPr>
-                      <m:t>0 </m:t>
-                    </m:r>
-                    <m:r>
-                      <a:rPr lang="da-DK" sz="1100" i="1" dirty="0">
-                        <a:latin typeface="Cambria Math" panose="02040503050406030204" pitchFamily="18" charset="0"/>
-                      </a:rPr>
-                      <m:t>𝑉</m:t>
-                    </m:r>
-                  </m:oMath>
-                </a14:m>
-                <a:r>
-                  <a:rPr lang="da-DK" sz="1100" dirty="0">
-                    <a:latin typeface="Times New Roman" panose="02020603050405020304" pitchFamily="18" charset="0"/>
-                    <a:cs typeface="Times New Roman" panose="02020603050405020304" pitchFamily="18" charset="0"/>
-                  </a:rPr>
-                  <a:t> vs. CHE</a:t>
-                </a:r>
-              </a:p>
-            </p:txBody>
-          </p:sp>
-        </mc:Choice>
-        <mc:Fallback>
-          <p:sp>
-            <p:nvSpPr>
-              <p:cNvPr id="40" name="TextBox 39">
-                <a:extLst>
-                  <a:ext uri="{FF2B5EF4-FFF2-40B4-BE49-F238E27FC236}">
-                    <a16:creationId xmlns:a16="http://schemas.microsoft.com/office/drawing/2014/main" id="{239A900E-0992-9AC8-E407-8D529B06058F}"/>
-                  </a:ext>
-                </a:extLst>
-              </p:cNvPr>
-              <p:cNvSpPr txBox="1">
-                <a:spLocks noRot="1" noChangeAspect="1" noMove="1" noResize="1" noEditPoints="1" noAdjustHandles="1" noChangeArrowheads="1" noChangeShapeType="1" noTextEdit="1"/>
-              </p:cNvSpPr>
-              <p:nvPr/>
-            </p:nvSpPr>
-            <p:spPr>
-              <a:xfrm>
-                <a:off x="4924403" y="2447844"/>
-                <a:ext cx="900888" cy="261610"/>
-              </a:xfrm>
-              <a:prstGeom prst="rect">
-                <a:avLst/>
-              </a:prstGeom>
-              <a:blipFill>
-                <a:blip r:embed="rId9"/>
-                <a:stretch>
-                  <a:fillRect b="-13636"/>
-                </a:stretch>
-              </a:blipFill>
-            </p:spPr>
-            <p:txBody>
-              <a:bodyPr/>
-              <a:lstStyle/>
-              <a:p>
-                <a:r>
-                  <a:rPr lang="da-DK">
-                    <a:noFill/>
-                  </a:rPr>
-                  <a:t> </a:t>
-                </a:r>
-              </a:p>
-            </p:txBody>
-          </p:sp>
-        </mc:Fallback>
-      </mc:AlternateContent>
       <p:cxnSp>
         <p:nvCxnSpPr>
           <p:cNvPr id="41" name="Straight Connector 40">
@@ -4887,7 +4649,7 @@
         </p:nvCxnSpPr>
         <p:spPr>
           <a:xfrm rot="5400000" flipV="1">
-            <a:off x="664351" y="553781"/>
+            <a:off x="756496" y="553781"/>
             <a:ext cx="0" cy="85906"/>
           </a:xfrm>
           <a:prstGeom prst="line">
@@ -4930,7 +4692,7 @@
         </p:nvCxnSpPr>
         <p:spPr>
           <a:xfrm rot="5400000" flipV="1">
-            <a:off x="659032" y="1253757"/>
+            <a:off x="751177" y="1253757"/>
             <a:ext cx="0" cy="85906"/>
           </a:xfrm>
           <a:prstGeom prst="line">
@@ -4973,7 +4735,7 @@
         </p:nvCxnSpPr>
         <p:spPr>
           <a:xfrm rot="5400000" flipV="1">
-            <a:off x="669670" y="1925375"/>
+            <a:off x="761815" y="1925375"/>
             <a:ext cx="0" cy="85906"/>
           </a:xfrm>
           <a:prstGeom prst="line">
@@ -5016,8 +4778,8 @@
             </p:nvSpPr>
             <p:spPr>
               <a:xfrm>
-                <a:off x="271330" y="512096"/>
-                <a:ext cx="307455" cy="169277"/>
+                <a:off x="561946" y="512096"/>
+                <a:ext cx="113814" cy="169277"/>
               </a:xfrm>
               <a:prstGeom prst="rect">
                 <a:avLst/>
@@ -5040,13 +4802,7 @@
                         <a:rPr lang="da-DK" sz="1100" i="1">
                           <a:latin typeface="Cambria Math" panose="02040503050406030204" pitchFamily="18" charset="0"/>
                         </a:rPr>
-                        <m:t>0 </m:t>
-                      </m:r>
-                      <m:r>
-                        <a:rPr lang="da-DK" sz="1100" i="1">
-                          <a:latin typeface="Cambria Math" panose="02040503050406030204" pitchFamily="18" charset="0"/>
-                        </a:rPr>
-                        <m:t>𝑒𝑉</m:t>
+                        <m:t>0</m:t>
                       </m:r>
                     </m:oMath>
                   </m:oMathPara>
@@ -5076,16 +4832,16 @@
             </p:nvSpPr>
             <p:spPr>
               <a:xfrm>
-                <a:off x="271330" y="512096"/>
-                <a:ext cx="307455" cy="169277"/>
+                <a:off x="561946" y="512096"/>
+                <a:ext cx="113814" cy="169277"/>
               </a:xfrm>
               <a:prstGeom prst="rect">
                 <a:avLst/>
               </a:prstGeom>
               <a:blipFill>
-                <a:blip r:embed="rId10"/>
+                <a:blip r:embed="rId7"/>
                 <a:stretch>
-                  <a:fillRect l="-8000" t="-7143" r="-8000" b="-42857"/>
+                  <a:fillRect l="-30000" r="-20000" b="-14286"/>
                 </a:stretch>
               </a:blipFill>
             </p:spPr>
@@ -5118,7 +4874,7 @@
         </p:nvSpPr>
         <p:spPr>
           <a:xfrm>
-            <a:off x="623776" y="2973244"/>
+            <a:off x="715921" y="2973244"/>
             <a:ext cx="4359349" cy="1899684"/>
           </a:xfrm>
           <a:prstGeom prst="rect">
@@ -5161,113 +4917,6 @@
         <mc:Choice xmlns:a14="http://schemas.microsoft.com/office/drawing/2010/main" Requires="a14">
           <p:sp>
             <p:nvSpPr>
-              <p:cNvPr id="46" name="TextBox 45">
-                <a:extLst>
-                  <a:ext uri="{FF2B5EF4-FFF2-40B4-BE49-F238E27FC236}">
-                    <a16:creationId xmlns:a16="http://schemas.microsoft.com/office/drawing/2014/main" id="{8A43D26B-6D7F-A309-C98D-CB94E3669A36}"/>
-                  </a:ext>
-                </a:extLst>
-              </p:cNvPr>
-              <p:cNvSpPr txBox="1"/>
-              <p:nvPr/>
-            </p:nvSpPr>
-            <p:spPr>
-              <a:xfrm rot="16200000">
-                <a:off x="336243" y="3838448"/>
-                <a:ext cx="213007" cy="169277"/>
-              </a:xfrm>
-              <a:prstGeom prst="rect">
-                <a:avLst/>
-              </a:prstGeom>
-              <a:noFill/>
-            </p:spPr>
-            <p:txBody>
-              <a:bodyPr wrap="none" lIns="0" tIns="0" rIns="0" bIns="0" rtlCol="0">
-                <a:spAutoFit/>
-              </a:bodyPr>
-              <a:lstStyle/>
-              <a:p>
-                <a14:m>
-                  <m:oMathPara xmlns:m="http://schemas.openxmlformats.org/officeDocument/2006/math">
-                    <m:oMathParaPr>
-                      <m:jc m:val="centerGroup"/>
-                    </m:oMathParaPr>
-                    <m:oMath xmlns:m="http://schemas.openxmlformats.org/officeDocument/2006/math">
-                      <m:r>
-                        <m:rPr>
-                          <m:sty m:val="p"/>
-                        </m:rPr>
-                        <a:rPr lang="da-DK" sz="1100">
-                          <a:latin typeface="Cambria Math" panose="02040503050406030204" pitchFamily="18" charset="0"/>
-                        </a:rPr>
-                        <m:t>Δ</m:t>
-                      </m:r>
-                      <m:r>
-                        <a:rPr lang="da-DK" sz="1100" i="1">
-                          <a:latin typeface="Cambria Math" panose="02040503050406030204" pitchFamily="18" charset="0"/>
-                        </a:rPr>
-                        <m:t>𝐺</m:t>
-                      </m:r>
-                    </m:oMath>
-                  </m:oMathPara>
-                </a14:m>
-                <a:endParaRPr lang="da-DK" sz="1100" dirty="0">
-                  <a:latin typeface="Times New Roman" panose="02020603050405020304" pitchFamily="18" charset="0"/>
-                  <a:cs typeface="Times New Roman" panose="02020603050405020304" pitchFamily="18" charset="0"/>
-                </a:endParaRPr>
-              </a:p>
-            </p:txBody>
-          </p:sp>
-        </mc:Choice>
-        <mc:Fallback>
-          <p:sp>
-            <p:nvSpPr>
-              <p:cNvPr id="46" name="TextBox 45">
-                <a:extLst>
-                  <a:ext uri="{FF2B5EF4-FFF2-40B4-BE49-F238E27FC236}">
-                    <a16:creationId xmlns:a16="http://schemas.microsoft.com/office/drawing/2014/main" id="{8A43D26B-6D7F-A309-C98D-CB94E3669A36}"/>
-                  </a:ext>
-                </a:extLst>
-              </p:cNvPr>
-              <p:cNvSpPr txBox="1">
-                <a:spLocks noRot="1" noChangeAspect="1" noMove="1" noResize="1" noEditPoints="1" noAdjustHandles="1" noChangeArrowheads="1" noChangeShapeType="1" noTextEdit="1"/>
-              </p:cNvSpPr>
-              <p:nvPr/>
-            </p:nvSpPr>
-            <p:spPr>
-              <a:xfrm rot="16200000">
-                <a:off x="336243" y="3838448"/>
-                <a:ext cx="213007" cy="169277"/>
-              </a:xfrm>
-              <a:prstGeom prst="rect">
-                <a:avLst/>
-              </a:prstGeom>
-              <a:blipFill>
-                <a:blip r:embed="rId11"/>
-                <a:stretch>
-                  <a:fillRect t="-11111" r="-7143" b="-11111"/>
-                </a:stretch>
-              </a:blipFill>
-            </p:spPr>
-            <p:txBody>
-              <a:bodyPr/>
-              <a:lstStyle/>
-              <a:p>
-                <a:r>
-                  <a:rPr lang="da-DK">
-                    <a:noFill/>
-                  </a:rPr>
-                  <a:t> </a:t>
-                </a:r>
-              </a:p>
-            </p:txBody>
-          </p:sp>
-        </mc:Fallback>
-      </mc:AlternateContent>
-      <mc:AlternateContent xmlns:mc="http://schemas.openxmlformats.org/markup-compatibility/2006">
-        <mc:Choice xmlns:a14="http://schemas.microsoft.com/office/drawing/2010/main" Requires="a14">
-          <p:sp>
-            <p:nvSpPr>
               <p:cNvPr id="47" name="TextBox 46">
                 <a:extLst>
                   <a:ext uri="{FF2B5EF4-FFF2-40B4-BE49-F238E27FC236}">
@@ -5280,7 +4929,7 @@
             </p:nvSpPr>
             <p:spPr>
               <a:xfrm>
-                <a:off x="942753" y="4932630"/>
+                <a:off x="1034898" y="4932630"/>
                 <a:ext cx="517065" cy="169277"/>
               </a:xfrm>
               <a:prstGeom prst="rect">
@@ -5334,16 +4983,16 @@
             </p:nvSpPr>
             <p:spPr>
               <a:xfrm>
-                <a:off x="942753" y="4932630"/>
+                <a:off x="1034898" y="4932630"/>
                 <a:ext cx="517065" cy="169277"/>
               </a:xfrm>
               <a:prstGeom prst="rect">
                 <a:avLst/>
               </a:prstGeom>
               <a:blipFill>
-                <a:blip r:embed="rId12"/>
+                <a:blip r:embed="rId8"/>
                 <a:stretch>
-                  <a:fillRect l="-4878" r="-4878" b="-14286"/>
+                  <a:fillRect l="-4762" r="-4762" b="-14286"/>
                 </a:stretch>
               </a:blipFill>
             </p:spPr>
@@ -5378,7 +5027,7 @@
             </p:nvSpPr>
             <p:spPr>
               <a:xfrm>
-                <a:off x="2160306" y="4960547"/>
+                <a:off x="2252451" y="4960547"/>
                 <a:ext cx="1260951" cy="169277"/>
               </a:xfrm>
               <a:prstGeom prst="rect">
@@ -5398,37 +5047,39 @@
                       <m:jc m:val="centerGroup"/>
                     </m:oMathParaPr>
                     <m:oMath xmlns:m="http://schemas.openxmlformats.org/officeDocument/2006/math">
-                      <m:r>
-                        <a:rPr lang="da-DK" sz="1100" i="1">
-                          <a:latin typeface="Cambria Math" panose="02040503050406030204" pitchFamily="18" charset="0"/>
-                        </a:rPr>
-                        <m:t>𝐶𝑂𝑂</m:t>
-                      </m:r>
-                      <m:sSup>
-                        <m:sSupPr>
+                      <m:sPre>
+                        <m:sPrePr>
                           <m:ctrlPr>
-                            <a:rPr lang="da-DK" sz="1100" i="1">
+                            <a:rPr lang="da-DK" sz="1100" i="1" smtClean="0">
                               <a:latin typeface="Cambria Math" panose="02040503050406030204" pitchFamily="18" charset="0"/>
                             </a:rPr>
                           </m:ctrlPr>
-                        </m:sSupPr>
-                        <m:e>
+                        </m:sPrePr>
+                        <m:sub>
                           <m:r>
-                            <a:rPr lang="da-DK" sz="1100" i="1">
+                            <a:rPr lang="da-DK" sz="1100" b="0" i="1" smtClean="0">
                               <a:latin typeface="Cambria Math" panose="02040503050406030204" pitchFamily="18" charset="0"/>
                             </a:rPr>
-                            <m:t>𝐻</m:t>
+                            <m:t> </m:t>
                           </m:r>
-                        </m:e>
+                        </m:sub>
                         <m:sup>
                           <m:r>
-                            <a:rPr lang="da-DK" sz="1100" i="1">
+                            <a:rPr lang="da-DK" sz="1100" b="0" i="1" smtClean="0">
                               <a:latin typeface="Cambria Math" panose="02040503050406030204" pitchFamily="18" charset="0"/>
                             </a:rPr>
                             <m:t>∗</m:t>
                           </m:r>
                         </m:sup>
-                      </m:sSup>
+                        <m:e>
+                          <m:r>
+                            <a:rPr lang="da-DK" sz="1100" b="0" i="1" smtClean="0">
+                              <a:latin typeface="Cambria Math" panose="02040503050406030204" pitchFamily="18" charset="0"/>
+                            </a:rPr>
+                            <m:t>𝐶𝑂𝑂𝐻</m:t>
+                          </m:r>
+                        </m:e>
+                      </m:sPre>
                       <m:r>
                         <a:rPr lang="da-DK" sz="1100" i="1">
                           <a:latin typeface="Cambria Math" panose="02040503050406030204" pitchFamily="18" charset="0"/>
@@ -5525,16 +5176,16 @@
             </p:nvSpPr>
             <p:spPr>
               <a:xfrm>
-                <a:off x="2160306" y="4960547"/>
+                <a:off x="2252451" y="4960547"/>
                 <a:ext cx="1260951" cy="169277"/>
               </a:xfrm>
               <a:prstGeom prst="rect">
                 <a:avLst/>
               </a:prstGeom>
               <a:blipFill>
-                <a:blip r:embed="rId13"/>
+                <a:blip r:embed="rId9"/>
                 <a:stretch>
-                  <a:fillRect l="-1980" r="-3960" b="-26667"/>
+                  <a:fillRect l="-1000" r="-4000" b="-33333"/>
                 </a:stretch>
               </a:blipFill>
             </p:spPr>
@@ -5569,7 +5220,7 @@
             </p:nvSpPr>
             <p:spPr>
               <a:xfrm>
-                <a:off x="3802184" y="4960547"/>
+                <a:off x="3894329" y="4960547"/>
                 <a:ext cx="1159676" cy="169277"/>
               </a:xfrm>
               <a:prstGeom prst="rect">
@@ -5716,14 +5367,14 @@
             </p:nvSpPr>
             <p:spPr>
               <a:xfrm>
-                <a:off x="3802184" y="4960547"/>
+                <a:off x="3894329" y="4960547"/>
                 <a:ext cx="1159676" cy="169277"/>
               </a:xfrm>
               <a:prstGeom prst="rect">
                 <a:avLst/>
               </a:prstGeom>
               <a:blipFill>
-                <a:blip r:embed="rId14"/>
+                <a:blip r:embed="rId10"/>
                 <a:stretch>
                   <a:fillRect l="-2174" r="-4348" b="-26667"/>
                 </a:stretch>
@@ -5760,7 +5411,7 @@
         </p:nvCxnSpPr>
         <p:spPr>
           <a:xfrm flipV="1">
-            <a:off x="1197738" y="4787022"/>
+            <a:off x="1289883" y="4787022"/>
             <a:ext cx="0" cy="85906"/>
           </a:xfrm>
           <a:prstGeom prst="line">
@@ -5803,7 +5454,7 @@
         </p:nvCxnSpPr>
         <p:spPr>
           <a:xfrm flipV="1">
-            <a:off x="2790751" y="4783479"/>
+            <a:off x="2882896" y="4783479"/>
             <a:ext cx="0" cy="85906"/>
           </a:xfrm>
           <a:prstGeom prst="line">
@@ -5846,7 +5497,7 @@
         </p:nvCxnSpPr>
         <p:spPr>
           <a:xfrm flipV="1">
-            <a:off x="4383763" y="4787023"/>
+            <a:off x="4475908" y="4787023"/>
             <a:ext cx="0" cy="85906"/>
           </a:xfrm>
           <a:prstGeom prst="line">
@@ -5889,7 +5540,7 @@
         </p:nvCxnSpPr>
         <p:spPr>
           <a:xfrm>
-            <a:off x="886044" y="3268551"/>
+            <a:off x="978189" y="3268551"/>
             <a:ext cx="623389" cy="0"/>
           </a:xfrm>
           <a:prstGeom prst="line">
@@ -5932,7 +5583,7 @@
         </p:nvCxnSpPr>
         <p:spPr>
           <a:xfrm>
-            <a:off x="2479057" y="4351290"/>
+            <a:off x="2571202" y="4347747"/>
             <a:ext cx="623389" cy="0"/>
           </a:xfrm>
           <a:prstGeom prst="line">
@@ -5975,7 +5626,7 @@
         </p:nvCxnSpPr>
         <p:spPr>
           <a:xfrm>
-            <a:off x="4047059" y="4640145"/>
+            <a:off x="4139204" y="4640145"/>
             <a:ext cx="623389" cy="0"/>
           </a:xfrm>
           <a:prstGeom prst="line">
@@ -6002,165 +5653,6 @@
           </a:fontRef>
         </p:style>
       </p:cxnSp>
-      <mc:AlternateContent xmlns:mc="http://schemas.openxmlformats.org/markup-compatibility/2006">
-        <mc:Choice xmlns:a14="http://schemas.microsoft.com/office/drawing/2010/main" Requires="a14">
-          <p:sp>
-            <p:nvSpPr>
-              <p:cNvPr id="56" name="TextBox 55">
-                <a:extLst>
-                  <a:ext uri="{FF2B5EF4-FFF2-40B4-BE49-F238E27FC236}">
-                    <a16:creationId xmlns:a16="http://schemas.microsoft.com/office/drawing/2014/main" id="{793261CE-5E98-9355-2CD2-704A3DFB5B5B}"/>
-                  </a:ext>
-                </a:extLst>
-              </p:cNvPr>
-              <p:cNvSpPr txBox="1"/>
-              <p:nvPr/>
-            </p:nvSpPr>
-            <p:spPr>
-              <a:xfrm>
-                <a:off x="2411656" y="4321885"/>
-                <a:ext cx="725519" cy="277320"/>
-              </a:xfrm>
-              <a:prstGeom prst="rect">
-                <a:avLst/>
-              </a:prstGeom>
-              <a:noFill/>
-            </p:spPr>
-            <p:txBody>
-              <a:bodyPr wrap="none" rtlCol="0">
-                <a:spAutoFit/>
-              </a:bodyPr>
-              <a:lstStyle/>
-              <a:p>
-                <a14:m>
-                  <m:oMathPara xmlns:m="http://schemas.openxmlformats.org/officeDocument/2006/math">
-                    <m:oMathParaPr>
-                      <m:jc m:val="centerGroup"/>
-                    </m:oMathParaPr>
-                    <m:oMath xmlns:m="http://schemas.openxmlformats.org/officeDocument/2006/math">
-                      <m:r>
-                        <m:rPr>
-                          <m:sty m:val="p"/>
-                        </m:rPr>
-                        <a:rPr lang="da-DK" sz="1100">
-                          <a:latin typeface="Cambria Math" panose="02040503050406030204" pitchFamily="18" charset="0"/>
-                        </a:rPr>
-                        <m:t>Δ</m:t>
-                      </m:r>
-                      <m:sSubSup>
-                        <m:sSubSupPr>
-                          <m:ctrlPr>
-                            <a:rPr lang="da-DK" sz="1100" i="1">
-                              <a:latin typeface="Cambria Math" panose="02040503050406030204" pitchFamily="18" charset="0"/>
-                            </a:rPr>
-                          </m:ctrlPr>
-                        </m:sSubSupPr>
-                        <m:e>
-                          <m:r>
-                            <a:rPr lang="da-DK" sz="1100" i="1">
-                              <a:latin typeface="Cambria Math" panose="02040503050406030204" pitchFamily="18" charset="0"/>
-                            </a:rPr>
-                            <m:t>𝐺</m:t>
-                          </m:r>
-                        </m:e>
-                        <m:sub>
-                          <m:r>
-                            <a:rPr lang="da-DK" sz="1100" i="1">
-                              <a:latin typeface="Cambria Math" panose="02040503050406030204" pitchFamily="18" charset="0"/>
-                            </a:rPr>
-                            <m:t>𝐶𝑂𝑂</m:t>
-                          </m:r>
-                          <m:sSup>
-                            <m:sSupPr>
-                              <m:ctrlPr>
-                                <a:rPr lang="da-DK" sz="1100" i="1">
-                                  <a:latin typeface="Cambria Math" panose="02040503050406030204" pitchFamily="18" charset="0"/>
-                                </a:rPr>
-                              </m:ctrlPr>
-                            </m:sSupPr>
-                            <m:e>
-                              <m:r>
-                                <a:rPr lang="da-DK" sz="1100" i="1">
-                                  <a:latin typeface="Cambria Math" panose="02040503050406030204" pitchFamily="18" charset="0"/>
-                                </a:rPr>
-                                <m:t>𝐻</m:t>
-                              </m:r>
-                            </m:e>
-                            <m:sup>
-                              <m:r>
-                                <a:rPr lang="da-DK" sz="1100" i="1">
-                                  <a:latin typeface="Cambria Math" panose="02040503050406030204" pitchFamily="18" charset="0"/>
-                                </a:rPr>
-                                <m:t>∗</m:t>
-                              </m:r>
-                            </m:sup>
-                          </m:sSup>
-                        </m:sub>
-                        <m:sup>
-                          <m:r>
-                            <a:rPr lang="da-DK" sz="1100" i="1">
-                              <a:latin typeface="Cambria Math" panose="02040503050406030204" pitchFamily="18" charset="0"/>
-                            </a:rPr>
-                            <m:t>𝐿𝑜𝑤</m:t>
-                          </m:r>
-                        </m:sup>
-                      </m:sSubSup>
-                    </m:oMath>
-                  </m:oMathPara>
-                </a14:m>
-                <a:endParaRPr lang="da-DK" sz="1100" dirty="0">
-                  <a:latin typeface="Times New Roman" panose="02020603050405020304" pitchFamily="18" charset="0"/>
-                  <a:cs typeface="Times New Roman" panose="02020603050405020304" pitchFamily="18" charset="0"/>
-                </a:endParaRPr>
-              </a:p>
-            </p:txBody>
-          </p:sp>
-        </mc:Choice>
-        <mc:Fallback>
-          <p:sp>
-            <p:nvSpPr>
-              <p:cNvPr id="56" name="TextBox 55">
-                <a:extLst>
-                  <a:ext uri="{FF2B5EF4-FFF2-40B4-BE49-F238E27FC236}">
-                    <a16:creationId xmlns:a16="http://schemas.microsoft.com/office/drawing/2014/main" id="{793261CE-5E98-9355-2CD2-704A3DFB5B5B}"/>
-                  </a:ext>
-                </a:extLst>
-              </p:cNvPr>
-              <p:cNvSpPr txBox="1">
-                <a:spLocks noRot="1" noChangeAspect="1" noMove="1" noResize="1" noEditPoints="1" noAdjustHandles="1" noChangeArrowheads="1" noChangeShapeType="1" noTextEdit="1"/>
-              </p:cNvSpPr>
-              <p:nvPr/>
-            </p:nvSpPr>
-            <p:spPr>
-              <a:xfrm>
-                <a:off x="2411656" y="4321885"/>
-                <a:ext cx="725519" cy="277320"/>
-              </a:xfrm>
-              <a:prstGeom prst="rect">
-                <a:avLst/>
-              </a:prstGeom>
-              <a:blipFill>
-                <a:blip r:embed="rId15"/>
-                <a:stretch>
-                  <a:fillRect/>
-                </a:stretch>
-              </a:blipFill>
-            </p:spPr>
-            <p:txBody>
-              <a:bodyPr/>
-              <a:lstStyle/>
-              <a:p>
-                <a:r>
-                  <a:rPr lang="da-DK">
-                    <a:noFill/>
-                  </a:rPr>
-                  <a:t> </a:t>
-                </a:r>
-              </a:p>
-            </p:txBody>
-          </p:sp>
-        </mc:Fallback>
-      </mc:AlternateContent>
       <p:cxnSp>
         <p:nvCxnSpPr>
           <p:cNvPr id="57" name="Straight Connector 56">
@@ -6177,7 +5669,7 @@
         </p:nvCxnSpPr>
         <p:spPr>
           <a:xfrm>
-            <a:off x="2479055" y="4039195"/>
+            <a:off x="2571200" y="4039195"/>
             <a:ext cx="623389" cy="0"/>
           </a:xfrm>
           <a:prstGeom prst="line">
@@ -6187,7 +5679,7 @@
             <a:solidFill>
               <a:srgbClr val="FF7300"/>
             </a:solidFill>
-            <a:prstDash val="sysDot"/>
+            <a:prstDash val="dash"/>
           </a:ln>
         </p:spPr>
         <p:style>
@@ -6221,7 +5713,7 @@
         </p:nvCxnSpPr>
         <p:spPr>
           <a:xfrm>
-            <a:off x="4047059" y="4039195"/>
+            <a:off x="4139204" y="4039195"/>
             <a:ext cx="623389" cy="0"/>
           </a:xfrm>
           <a:prstGeom prst="line">
@@ -6231,7 +5723,7 @@
             <a:solidFill>
               <a:srgbClr val="1B981B"/>
             </a:solidFill>
-            <a:prstDash val="sysDot"/>
+            <a:prstDash val="dash"/>
           </a:ln>
         </p:spPr>
         <p:style>
@@ -6249,108 +5741,6 @@
           </a:fontRef>
         </p:style>
       </p:cxnSp>
-      <mc:AlternateContent xmlns:mc="http://schemas.openxmlformats.org/markup-compatibility/2006">
-        <mc:Choice xmlns:a14="http://schemas.microsoft.com/office/drawing/2010/main" Requires="a14">
-          <p:sp>
-            <p:nvSpPr>
-              <p:cNvPr id="59" name="TextBox 58">
-                <a:extLst>
-                  <a:ext uri="{FF2B5EF4-FFF2-40B4-BE49-F238E27FC236}">
-                    <a16:creationId xmlns:a16="http://schemas.microsoft.com/office/drawing/2014/main" id="{6C562C8A-1A16-7790-CB3A-7432F4956B90}"/>
-                  </a:ext>
-                </a:extLst>
-              </p:cNvPr>
-              <p:cNvSpPr txBox="1"/>
-              <p:nvPr/>
-            </p:nvSpPr>
-            <p:spPr>
-              <a:xfrm>
-                <a:off x="4961860" y="2631641"/>
-                <a:ext cx="900888" cy="261610"/>
-              </a:xfrm>
-              <a:prstGeom prst="rect">
-                <a:avLst/>
-              </a:prstGeom>
-              <a:noFill/>
-            </p:spPr>
-            <p:txBody>
-              <a:bodyPr wrap="none" rtlCol="0">
-                <a:spAutoFit/>
-              </a:bodyPr>
-              <a:lstStyle/>
-              <a:p>
-                <a14:m>
-                  <m:oMath xmlns:m="http://schemas.openxmlformats.org/officeDocument/2006/math">
-                    <m:r>
-                      <a:rPr lang="da-DK" sz="1100" i="1" dirty="0">
-                        <a:latin typeface="Cambria Math" panose="02040503050406030204" pitchFamily="18" charset="0"/>
-                      </a:rPr>
-                      <m:t>0 </m:t>
-                    </m:r>
-                    <m:r>
-                      <a:rPr lang="da-DK" sz="1100" i="1" dirty="0">
-                        <a:latin typeface="Cambria Math" panose="02040503050406030204" pitchFamily="18" charset="0"/>
-                      </a:rPr>
-                      <m:t>𝑉</m:t>
-                    </m:r>
-                  </m:oMath>
-                </a14:m>
-                <a:r>
-                  <a:rPr lang="da-DK" sz="1100" dirty="0">
-                    <a:latin typeface="Times New Roman" panose="02020603050405020304" pitchFamily="18" charset="0"/>
-                    <a:cs typeface="Times New Roman" panose="02020603050405020304" pitchFamily="18" charset="0"/>
-                  </a:rPr>
-                  <a:t> vs. CHE</a:t>
-                </a:r>
-              </a:p>
-            </p:txBody>
-          </p:sp>
-        </mc:Choice>
-        <mc:Fallback>
-          <p:sp>
-            <p:nvSpPr>
-              <p:cNvPr id="59" name="TextBox 58">
-                <a:extLst>
-                  <a:ext uri="{FF2B5EF4-FFF2-40B4-BE49-F238E27FC236}">
-                    <a16:creationId xmlns:a16="http://schemas.microsoft.com/office/drawing/2014/main" id="{6C562C8A-1A16-7790-CB3A-7432F4956B90}"/>
-                  </a:ext>
-                </a:extLst>
-              </p:cNvPr>
-              <p:cNvSpPr txBox="1">
-                <a:spLocks noRot="1" noChangeAspect="1" noMove="1" noResize="1" noEditPoints="1" noAdjustHandles="1" noChangeArrowheads="1" noChangeShapeType="1" noTextEdit="1"/>
-              </p:cNvSpPr>
-              <p:nvPr/>
-            </p:nvSpPr>
-            <p:spPr>
-              <a:xfrm>
-                <a:off x="4961860" y="2631641"/>
-                <a:ext cx="900888" cy="261610"/>
-              </a:xfrm>
-              <a:prstGeom prst="rect">
-                <a:avLst/>
-              </a:prstGeom>
-              <a:blipFill>
-                <a:blip r:embed="rId16"/>
-                <a:stretch>
-                  <a:fillRect b="-13636"/>
-                </a:stretch>
-              </a:blipFill>
-            </p:spPr>
-            <p:txBody>
-              <a:bodyPr/>
-              <a:lstStyle/>
-              <a:p>
-                <a:r>
-                  <a:rPr lang="da-DK">
-                    <a:noFill/>
-                  </a:rPr>
-                  <a:t> </a:t>
-                </a:r>
-              </a:p>
-            </p:txBody>
-          </p:sp>
-        </mc:Fallback>
-      </mc:AlternateContent>
       <p:cxnSp>
         <p:nvCxnSpPr>
           <p:cNvPr id="60" name="Straight Connector 59">
@@ -6367,7 +5757,7 @@
         </p:nvCxnSpPr>
         <p:spPr>
           <a:xfrm rot="5400000" flipV="1">
-            <a:off x="664351" y="3225598"/>
+            <a:off x="756496" y="3225598"/>
             <a:ext cx="0" cy="85906"/>
           </a:xfrm>
           <a:prstGeom prst="line">
@@ -6410,7 +5800,7 @@
         </p:nvCxnSpPr>
         <p:spPr>
           <a:xfrm rot="5400000" flipV="1">
-            <a:off x="659032" y="3925574"/>
+            <a:off x="751177" y="4304794"/>
             <a:ext cx="0" cy="85906"/>
           </a:xfrm>
           <a:prstGeom prst="line">
@@ -6453,7 +5843,7 @@
         </p:nvCxnSpPr>
         <p:spPr>
           <a:xfrm rot="5400000" flipV="1">
-            <a:off x="669670" y="4597192"/>
+            <a:off x="761815" y="4597192"/>
             <a:ext cx="0" cy="85906"/>
           </a:xfrm>
           <a:prstGeom prst="line">
@@ -6496,8 +5886,8 @@
             </p:nvSpPr>
             <p:spPr>
               <a:xfrm>
-                <a:off x="271330" y="3183913"/>
-                <a:ext cx="307455" cy="169277"/>
+                <a:off x="561946" y="3183912"/>
+                <a:ext cx="113814" cy="169277"/>
               </a:xfrm>
               <a:prstGeom prst="rect">
                 <a:avLst/>
@@ -6520,13 +5910,7 @@
                         <a:rPr lang="da-DK" sz="1100" i="1">
                           <a:latin typeface="Cambria Math" panose="02040503050406030204" pitchFamily="18" charset="0"/>
                         </a:rPr>
-                        <m:t>0 </m:t>
-                      </m:r>
-                      <m:r>
-                        <a:rPr lang="da-DK" sz="1100" i="1">
-                          <a:latin typeface="Cambria Math" panose="02040503050406030204" pitchFamily="18" charset="0"/>
-                        </a:rPr>
-                        <m:t>𝑒𝑉</m:t>
+                        <m:t>0</m:t>
                       </m:r>
                     </m:oMath>
                   </m:oMathPara>
@@ -6556,16 +5940,16 @@
             </p:nvSpPr>
             <p:spPr>
               <a:xfrm>
-                <a:off x="271330" y="3183913"/>
-                <a:ext cx="307455" cy="169277"/>
+                <a:off x="561946" y="3183912"/>
+                <a:ext cx="113814" cy="169277"/>
               </a:xfrm>
               <a:prstGeom prst="rect">
                 <a:avLst/>
               </a:prstGeom>
               <a:blipFill>
-                <a:blip r:embed="rId17"/>
+                <a:blip r:embed="rId7"/>
                 <a:stretch>
-                  <a:fillRect l="-8000" r="-8000" b="-42857"/>
+                  <a:fillRect l="-30000" r="-20000" b="-14286"/>
                 </a:stretch>
               </a:blipFill>
             </p:spPr>
@@ -6600,8 +5984,8 @@
         </p:nvCxnSpPr>
         <p:spPr>
           <a:xfrm flipV="1">
-            <a:off x="2781503" y="681372"/>
-            <a:ext cx="0" cy="558634"/>
+            <a:off x="2873648" y="617998"/>
+            <a:ext cx="0" cy="643272"/>
           </a:xfrm>
           <a:prstGeom prst="straightConnector1">
             <a:avLst/>
@@ -6645,8 +6029,8 @@
         </p:nvCxnSpPr>
         <p:spPr>
           <a:xfrm flipV="1">
-            <a:off x="4379334" y="681373"/>
-            <a:ext cx="0" cy="1233431"/>
+            <a:off x="4471479" y="625086"/>
+            <a:ext cx="0" cy="1318070"/>
           </a:xfrm>
           <a:prstGeom prst="straightConnector1">
             <a:avLst/>
@@ -6690,7 +6074,7 @@
             </p:nvSpPr>
             <p:spPr>
               <a:xfrm>
-                <a:off x="2842204" y="885318"/>
+                <a:off x="2934349" y="878230"/>
                 <a:ext cx="135806" cy="169277"/>
               </a:xfrm>
               <a:prstGeom prst="rect">
@@ -6744,16 +6128,16 @@
             </p:nvSpPr>
             <p:spPr>
               <a:xfrm>
-                <a:off x="2842204" y="885318"/>
+                <a:off x="2934349" y="878230"/>
                 <a:ext cx="135806" cy="169277"/>
               </a:xfrm>
               <a:prstGeom prst="rect">
                 <a:avLst/>
               </a:prstGeom>
               <a:blipFill>
-                <a:blip r:embed="rId18"/>
+                <a:blip r:embed="rId11"/>
                 <a:stretch>
-                  <a:fillRect l="-16667" r="-16667" b="-6667"/>
+                  <a:fillRect l="-16667" r="-16667" b="-7143"/>
                 </a:stretch>
               </a:blipFill>
             </p:spPr>
@@ -6788,7 +6172,7 @@
             </p:nvSpPr>
             <p:spPr>
               <a:xfrm>
-                <a:off x="4422104" y="1264443"/>
+                <a:off x="4514249" y="1200648"/>
                 <a:ext cx="244811" cy="169277"/>
               </a:xfrm>
               <a:prstGeom prst="rect">
@@ -6848,16 +6232,16 @@
             </p:nvSpPr>
             <p:spPr>
               <a:xfrm>
-                <a:off x="4422104" y="1264443"/>
+                <a:off x="4514249" y="1200648"/>
                 <a:ext cx="244811" cy="169277"/>
               </a:xfrm>
               <a:prstGeom prst="rect">
                 <a:avLst/>
               </a:prstGeom>
               <a:blipFill>
-                <a:blip r:embed="rId19"/>
+                <a:blip r:embed="rId12"/>
                 <a:stretch>
-                  <a:fillRect l="-10000" t="-7143" r="-10000" b="-42857"/>
+                  <a:fillRect l="-10000" r="-10000" b="-33333"/>
                 </a:stretch>
               </a:blipFill>
             </p:spPr>
@@ -6892,8 +6276,8 @@
         </p:nvCxnSpPr>
         <p:spPr>
           <a:xfrm flipV="1">
-            <a:off x="2776254" y="4089456"/>
-            <a:ext cx="0" cy="210759"/>
+            <a:off x="2868399" y="4053371"/>
+            <a:ext cx="0" cy="273600"/>
           </a:xfrm>
           <a:prstGeom prst="straightConnector1">
             <a:avLst/>
@@ -6937,7 +6321,7 @@
             </p:nvSpPr>
             <p:spPr>
               <a:xfrm>
-                <a:off x="2836955" y="3817940"/>
+                <a:off x="2898328" y="4115715"/>
                 <a:ext cx="135806" cy="169277"/>
               </a:xfrm>
               <a:prstGeom prst="rect">
@@ -6991,16 +6375,16 @@
             </p:nvSpPr>
             <p:spPr>
               <a:xfrm>
-                <a:off x="2836955" y="3817940"/>
+                <a:off x="2898328" y="4115715"/>
                 <a:ext cx="135806" cy="169277"/>
               </a:xfrm>
               <a:prstGeom prst="rect">
                 <a:avLst/>
               </a:prstGeom>
               <a:blipFill>
-                <a:blip r:embed="rId20"/>
+                <a:blip r:embed="rId13"/>
                 <a:stretch>
-                  <a:fillRect l="-25000" r="-16667" b="-14286"/>
+                  <a:fillRect l="-16667" r="-8333" b="-7143"/>
                 </a:stretch>
               </a:blipFill>
             </p:spPr>
@@ -7035,8 +6419,8 @@
         </p:nvCxnSpPr>
         <p:spPr>
           <a:xfrm flipV="1">
-            <a:off x="4381590" y="4089456"/>
-            <a:ext cx="0" cy="482988"/>
+            <a:off x="4472607" y="4068192"/>
+            <a:ext cx="0" cy="536400"/>
           </a:xfrm>
           <a:prstGeom prst="straightConnector1">
             <a:avLst/>
@@ -7080,7 +6464,7 @@
             </p:nvSpPr>
             <p:spPr>
               <a:xfrm>
-                <a:off x="4426980" y="3777694"/>
+                <a:off x="4502697" y="4266446"/>
                 <a:ext cx="244811" cy="169277"/>
               </a:xfrm>
               <a:prstGeom prst="rect">
@@ -7140,16 +6524,16 @@
             </p:nvSpPr>
             <p:spPr>
               <a:xfrm>
-                <a:off x="4426980" y="3777694"/>
+                <a:off x="4502697" y="4266446"/>
                 <a:ext cx="244811" cy="169277"/>
               </a:xfrm>
               <a:prstGeom prst="rect">
                 <a:avLst/>
               </a:prstGeom>
               <a:blipFill>
-                <a:blip r:embed="rId21"/>
+                <a:blip r:embed="rId14"/>
                 <a:stretch>
-                  <a:fillRect l="-10000" r="-15000" b="-42857"/>
+                  <a:fillRect l="-10000" t="-7143" r="-10000" b="-42857"/>
                 </a:stretch>
               </a:blipFill>
             </p:spPr>
@@ -7184,7 +6568,7 @@
         </p:nvCxnSpPr>
         <p:spPr>
           <a:xfrm>
-            <a:off x="4047058" y="3261462"/>
+            <a:off x="4139203" y="3261462"/>
             <a:ext cx="623389" cy="0"/>
           </a:xfrm>
           <a:prstGeom prst="line">
@@ -7192,9 +6576,11 @@
           </a:prstGeom>
           <a:ln w="12700">
             <a:solidFill>
-              <a:srgbClr val="1B981B"/>
+              <a:schemeClr val="bg2">
+                <a:lumMod val="75000"/>
+              </a:schemeClr>
             </a:solidFill>
-            <a:prstDash val="dash"/>
+            <a:prstDash val="sysDot"/>
           </a:ln>
         </p:spPr>
         <p:style>
@@ -7226,7 +6612,7 @@
         </p:nvSpPr>
         <p:spPr>
           <a:xfrm>
-            <a:off x="623776" y="5551421"/>
+            <a:off x="715921" y="5551421"/>
             <a:ext cx="4359349" cy="1899684"/>
           </a:xfrm>
           <a:prstGeom prst="rect">
@@ -7269,113 +6655,6 @@
         <mc:Choice xmlns:a14="http://schemas.microsoft.com/office/drawing/2010/main" Requires="a14">
           <p:sp>
             <p:nvSpPr>
-              <p:cNvPr id="93" name="TextBox 92">
-                <a:extLst>
-                  <a:ext uri="{FF2B5EF4-FFF2-40B4-BE49-F238E27FC236}">
-                    <a16:creationId xmlns:a16="http://schemas.microsoft.com/office/drawing/2014/main" id="{5725D776-E537-83A7-0B31-AA8B8025342C}"/>
-                  </a:ext>
-                </a:extLst>
-              </p:cNvPr>
-              <p:cNvSpPr txBox="1"/>
-              <p:nvPr/>
-            </p:nvSpPr>
-            <p:spPr>
-              <a:xfrm rot="16200000">
-                <a:off x="336243" y="6416625"/>
-                <a:ext cx="213007" cy="169277"/>
-              </a:xfrm>
-              <a:prstGeom prst="rect">
-                <a:avLst/>
-              </a:prstGeom>
-              <a:noFill/>
-            </p:spPr>
-            <p:txBody>
-              <a:bodyPr wrap="none" lIns="0" tIns="0" rIns="0" bIns="0" rtlCol="0">
-                <a:spAutoFit/>
-              </a:bodyPr>
-              <a:lstStyle/>
-              <a:p>
-                <a14:m>
-                  <m:oMathPara xmlns:m="http://schemas.openxmlformats.org/officeDocument/2006/math">
-                    <m:oMathParaPr>
-                      <m:jc m:val="centerGroup"/>
-                    </m:oMathParaPr>
-                    <m:oMath xmlns:m="http://schemas.openxmlformats.org/officeDocument/2006/math">
-                      <m:r>
-                        <m:rPr>
-                          <m:sty m:val="p"/>
-                        </m:rPr>
-                        <a:rPr lang="da-DK" sz="1100">
-                          <a:latin typeface="Cambria Math" panose="02040503050406030204" pitchFamily="18" charset="0"/>
-                        </a:rPr>
-                        <m:t>Δ</m:t>
-                      </m:r>
-                      <m:r>
-                        <a:rPr lang="da-DK" sz="1100" i="1">
-                          <a:latin typeface="Cambria Math" panose="02040503050406030204" pitchFamily="18" charset="0"/>
-                        </a:rPr>
-                        <m:t>𝐺</m:t>
-                      </m:r>
-                    </m:oMath>
-                  </m:oMathPara>
-                </a14:m>
-                <a:endParaRPr lang="da-DK" sz="1100" dirty="0">
-                  <a:latin typeface="Times New Roman" panose="02020603050405020304" pitchFamily="18" charset="0"/>
-                  <a:cs typeface="Times New Roman" panose="02020603050405020304" pitchFamily="18" charset="0"/>
-                </a:endParaRPr>
-              </a:p>
-            </p:txBody>
-          </p:sp>
-        </mc:Choice>
-        <mc:Fallback>
-          <p:sp>
-            <p:nvSpPr>
-              <p:cNvPr id="93" name="TextBox 92">
-                <a:extLst>
-                  <a:ext uri="{FF2B5EF4-FFF2-40B4-BE49-F238E27FC236}">
-                    <a16:creationId xmlns:a16="http://schemas.microsoft.com/office/drawing/2014/main" id="{5725D776-E537-83A7-0B31-AA8B8025342C}"/>
-                  </a:ext>
-                </a:extLst>
-              </p:cNvPr>
-              <p:cNvSpPr txBox="1">
-                <a:spLocks noRot="1" noChangeAspect="1" noMove="1" noResize="1" noEditPoints="1" noAdjustHandles="1" noChangeArrowheads="1" noChangeShapeType="1" noTextEdit="1"/>
-              </p:cNvSpPr>
-              <p:nvPr/>
-            </p:nvSpPr>
-            <p:spPr>
-              <a:xfrm rot="16200000">
-                <a:off x="336243" y="6416625"/>
-                <a:ext cx="213007" cy="169277"/>
-              </a:xfrm>
-              <a:prstGeom prst="rect">
-                <a:avLst/>
-              </a:prstGeom>
-              <a:blipFill>
-                <a:blip r:embed="rId11"/>
-                <a:stretch>
-                  <a:fillRect t="-11111" r="-7143" b="-11111"/>
-                </a:stretch>
-              </a:blipFill>
-            </p:spPr>
-            <p:txBody>
-              <a:bodyPr/>
-              <a:lstStyle/>
-              <a:p>
-                <a:r>
-                  <a:rPr lang="da-DK">
-                    <a:noFill/>
-                  </a:rPr>
-                  <a:t> </a:t>
-                </a:r>
-              </a:p>
-            </p:txBody>
-          </p:sp>
-        </mc:Fallback>
-      </mc:AlternateContent>
-      <mc:AlternateContent xmlns:mc="http://schemas.openxmlformats.org/markup-compatibility/2006">
-        <mc:Choice xmlns:a14="http://schemas.microsoft.com/office/drawing/2010/main" Requires="a14">
-          <p:sp>
-            <p:nvSpPr>
               <p:cNvPr id="94" name="TextBox 93">
                 <a:extLst>
                   <a:ext uri="{FF2B5EF4-FFF2-40B4-BE49-F238E27FC236}">
@@ -7388,7 +6667,7 @@
             </p:nvSpPr>
             <p:spPr>
               <a:xfrm>
-                <a:off x="942753" y="7510807"/>
+                <a:off x="1034898" y="7510807"/>
                 <a:ext cx="517065" cy="169277"/>
               </a:xfrm>
               <a:prstGeom prst="rect">
@@ -7442,16 +6721,16 @@
             </p:nvSpPr>
             <p:spPr>
               <a:xfrm>
-                <a:off x="942753" y="7510807"/>
+                <a:off x="1034898" y="7510807"/>
                 <a:ext cx="517065" cy="169277"/>
               </a:xfrm>
               <a:prstGeom prst="rect">
                 <a:avLst/>
               </a:prstGeom>
               <a:blipFill>
-                <a:blip r:embed="rId12"/>
+                <a:blip r:embed="rId8"/>
                 <a:stretch>
-                  <a:fillRect l="-4878" r="-4878" b="-14286"/>
+                  <a:fillRect l="-4762" r="-4762" b="-14286"/>
                 </a:stretch>
               </a:blipFill>
             </p:spPr>
@@ -7486,7 +6765,7 @@
             </p:nvSpPr>
             <p:spPr>
               <a:xfrm>
-                <a:off x="2160306" y="7538724"/>
+                <a:off x="2252451" y="7538724"/>
                 <a:ext cx="1260951" cy="169277"/>
               </a:xfrm>
               <a:prstGeom prst="rect">
@@ -7506,28 +6785,22 @@
                       <m:jc m:val="centerGroup"/>
                     </m:oMathParaPr>
                     <m:oMath xmlns:m="http://schemas.openxmlformats.org/officeDocument/2006/math">
-                      <m:r>
-                        <a:rPr lang="da-DK" sz="1100" i="1">
-                          <a:latin typeface="Cambria Math" panose="02040503050406030204" pitchFamily="18" charset="0"/>
-                        </a:rPr>
-                        <m:t>𝐶𝑂𝑂</m:t>
-                      </m:r>
-                      <m:sSup>
-                        <m:sSupPr>
+                      <m:sPre>
+                        <m:sPrePr>
                           <m:ctrlPr>
                             <a:rPr lang="da-DK" sz="1100" i="1">
                               <a:latin typeface="Cambria Math" panose="02040503050406030204" pitchFamily="18" charset="0"/>
                             </a:rPr>
                           </m:ctrlPr>
-                        </m:sSupPr>
-                        <m:e>
+                        </m:sPrePr>
+                        <m:sub>
                           <m:r>
                             <a:rPr lang="da-DK" sz="1100" i="1">
                               <a:latin typeface="Cambria Math" panose="02040503050406030204" pitchFamily="18" charset="0"/>
                             </a:rPr>
-                            <m:t>𝐻</m:t>
+                            <m:t> </m:t>
                           </m:r>
-                        </m:e>
+                        </m:sub>
                         <m:sup>
                           <m:r>
                             <a:rPr lang="da-DK" sz="1100" i="1">
@@ -7536,7 +6809,15 @@
                             <m:t>∗</m:t>
                           </m:r>
                         </m:sup>
-                      </m:sSup>
+                        <m:e>
+                          <m:r>
+                            <a:rPr lang="da-DK" sz="1100" i="1">
+                              <a:latin typeface="Cambria Math" panose="02040503050406030204" pitchFamily="18" charset="0"/>
+                            </a:rPr>
+                            <m:t>𝐶𝑂𝑂𝐻</m:t>
+                          </m:r>
+                        </m:e>
+                      </m:sPre>
                       <m:r>
                         <a:rPr lang="da-DK" sz="1100" i="1">
                           <a:latin typeface="Cambria Math" panose="02040503050406030204" pitchFamily="18" charset="0"/>
@@ -7633,16 +6914,16 @@
             </p:nvSpPr>
             <p:spPr>
               <a:xfrm>
-                <a:off x="2160306" y="7538724"/>
+                <a:off x="2252451" y="7538724"/>
                 <a:ext cx="1260951" cy="169277"/>
               </a:xfrm>
               <a:prstGeom prst="rect">
                 <a:avLst/>
               </a:prstGeom>
               <a:blipFill>
-                <a:blip r:embed="rId13"/>
+                <a:blip r:embed="rId9"/>
                 <a:stretch>
-                  <a:fillRect l="-1980" r="-3960" b="-35714"/>
+                  <a:fillRect l="-1000" r="-4000" b="-42857"/>
                 </a:stretch>
               </a:blipFill>
             </p:spPr>
@@ -7677,7 +6958,7 @@
             </p:nvSpPr>
             <p:spPr>
               <a:xfrm>
-                <a:off x="3802184" y="7538724"/>
+                <a:off x="3894329" y="7538724"/>
                 <a:ext cx="1159676" cy="169277"/>
               </a:xfrm>
               <a:prstGeom prst="rect">
@@ -7824,14 +7105,14 @@
             </p:nvSpPr>
             <p:spPr>
               <a:xfrm>
-                <a:off x="3802184" y="7538724"/>
+                <a:off x="3894329" y="7538724"/>
                 <a:ext cx="1159676" cy="169277"/>
               </a:xfrm>
               <a:prstGeom prst="rect">
                 <a:avLst/>
               </a:prstGeom>
               <a:blipFill>
-                <a:blip r:embed="rId14"/>
+                <a:blip r:embed="rId10"/>
                 <a:stretch>
                   <a:fillRect l="-2174" r="-4348" b="-35714"/>
                 </a:stretch>
@@ -7868,7 +7149,7 @@
         </p:nvCxnSpPr>
         <p:spPr>
           <a:xfrm flipV="1">
-            <a:off x="1197738" y="7365199"/>
+            <a:off x="1289883" y="7365199"/>
             <a:ext cx="0" cy="85906"/>
           </a:xfrm>
           <a:prstGeom prst="line">
@@ -7911,7 +7192,7 @@
         </p:nvCxnSpPr>
         <p:spPr>
           <a:xfrm flipV="1">
-            <a:off x="2790751" y="7361656"/>
+            <a:off x="2882896" y="7361656"/>
             <a:ext cx="0" cy="85906"/>
           </a:xfrm>
           <a:prstGeom prst="line">
@@ -7954,7 +7235,7 @@
         </p:nvCxnSpPr>
         <p:spPr>
           <a:xfrm flipV="1">
-            <a:off x="4383763" y="7365200"/>
+            <a:off x="4475908" y="7365200"/>
             <a:ext cx="0" cy="85906"/>
           </a:xfrm>
           <a:prstGeom prst="line">
@@ -7997,7 +7278,7 @@
         </p:nvCxnSpPr>
         <p:spPr>
           <a:xfrm>
-            <a:off x="886044" y="5846728"/>
+            <a:off x="978189" y="5846728"/>
             <a:ext cx="623389" cy="0"/>
           </a:xfrm>
           <a:prstGeom prst="line">
@@ -8040,7 +7321,7 @@
         </p:nvCxnSpPr>
         <p:spPr>
           <a:xfrm>
-            <a:off x="2479057" y="6213554"/>
+            <a:off x="2571202" y="6217098"/>
             <a:ext cx="623389" cy="0"/>
           </a:xfrm>
           <a:prstGeom prst="line">
@@ -8083,7 +7364,7 @@
         </p:nvCxnSpPr>
         <p:spPr>
           <a:xfrm>
-            <a:off x="4047059" y="7218322"/>
+            <a:off x="4139204" y="7218322"/>
             <a:ext cx="623389" cy="0"/>
           </a:xfrm>
           <a:prstGeom prst="line">
@@ -8110,165 +7391,6 @@
           </a:fontRef>
         </p:style>
       </p:cxnSp>
-      <mc:AlternateContent xmlns:mc="http://schemas.openxmlformats.org/markup-compatibility/2006">
-        <mc:Choice xmlns:a14="http://schemas.microsoft.com/office/drawing/2010/main" Requires="a14">
-          <p:sp>
-            <p:nvSpPr>
-              <p:cNvPr id="103" name="TextBox 102">
-                <a:extLst>
-                  <a:ext uri="{FF2B5EF4-FFF2-40B4-BE49-F238E27FC236}">
-                    <a16:creationId xmlns:a16="http://schemas.microsoft.com/office/drawing/2014/main" id="{5C409916-F4A5-6BB1-30A3-D5D74208D15F}"/>
-                  </a:ext>
-                </a:extLst>
-              </p:cNvPr>
-              <p:cNvSpPr txBox="1"/>
-              <p:nvPr/>
-            </p:nvSpPr>
-            <p:spPr>
-              <a:xfrm>
-                <a:off x="2411656" y="6184149"/>
-                <a:ext cx="725519" cy="305789"/>
-              </a:xfrm>
-              <a:prstGeom prst="rect">
-                <a:avLst/>
-              </a:prstGeom>
-              <a:noFill/>
-            </p:spPr>
-            <p:txBody>
-              <a:bodyPr wrap="none" rtlCol="0">
-                <a:spAutoFit/>
-              </a:bodyPr>
-              <a:lstStyle/>
-              <a:p>
-                <a14:m>
-                  <m:oMathPara xmlns:m="http://schemas.openxmlformats.org/officeDocument/2006/math">
-                    <m:oMathParaPr>
-                      <m:jc m:val="centerGroup"/>
-                    </m:oMathParaPr>
-                    <m:oMath xmlns:m="http://schemas.openxmlformats.org/officeDocument/2006/math">
-                      <m:r>
-                        <m:rPr>
-                          <m:sty m:val="p"/>
-                        </m:rPr>
-                        <a:rPr lang="da-DK" sz="1100" smtClean="0">
-                          <a:latin typeface="Cambria Math" panose="02040503050406030204" pitchFamily="18" charset="0"/>
-                        </a:rPr>
-                        <m:t>Δ</m:t>
-                      </m:r>
-                      <m:sSubSup>
-                        <m:sSubSupPr>
-                          <m:ctrlPr>
-                            <a:rPr lang="da-DK" sz="1100" i="1">
-                              <a:latin typeface="Cambria Math" panose="02040503050406030204" pitchFamily="18" charset="0"/>
-                            </a:rPr>
-                          </m:ctrlPr>
-                        </m:sSubSupPr>
-                        <m:e>
-                          <m:r>
-                            <a:rPr lang="da-DK" sz="1100" i="1">
-                              <a:latin typeface="Cambria Math" panose="02040503050406030204" pitchFamily="18" charset="0"/>
-                            </a:rPr>
-                            <m:t>𝐺</m:t>
-                          </m:r>
-                        </m:e>
-                        <m:sub>
-                          <m:r>
-                            <a:rPr lang="da-DK" sz="1100" i="1">
-                              <a:latin typeface="Cambria Math" panose="02040503050406030204" pitchFamily="18" charset="0"/>
-                            </a:rPr>
-                            <m:t>𝐶𝑂𝑂</m:t>
-                          </m:r>
-                          <m:sSup>
-                            <m:sSupPr>
-                              <m:ctrlPr>
-                                <a:rPr lang="da-DK" sz="1100" i="1">
-                                  <a:latin typeface="Cambria Math" panose="02040503050406030204" pitchFamily="18" charset="0"/>
-                                </a:rPr>
-                              </m:ctrlPr>
-                            </m:sSupPr>
-                            <m:e>
-                              <m:r>
-                                <a:rPr lang="da-DK" sz="1100" i="1">
-                                  <a:latin typeface="Cambria Math" panose="02040503050406030204" pitchFamily="18" charset="0"/>
-                                </a:rPr>
-                                <m:t>𝐻</m:t>
-                              </m:r>
-                            </m:e>
-                            <m:sup>
-                              <m:r>
-                                <a:rPr lang="da-DK" sz="1100" i="1">
-                                  <a:latin typeface="Cambria Math" panose="02040503050406030204" pitchFamily="18" charset="0"/>
-                                </a:rPr>
-                                <m:t>∗</m:t>
-                              </m:r>
-                            </m:sup>
-                          </m:sSup>
-                        </m:sub>
-                        <m:sup>
-                          <m:r>
-                            <a:rPr lang="da-DK" sz="1100" b="0" i="1" smtClean="0">
-                              <a:latin typeface="Cambria Math" panose="02040503050406030204" pitchFamily="18" charset="0"/>
-                            </a:rPr>
-                            <m:t>𝐻𝑖𝑔h</m:t>
-                          </m:r>
-                        </m:sup>
-                      </m:sSubSup>
-                    </m:oMath>
-                  </m:oMathPara>
-                </a14:m>
-                <a:endParaRPr lang="da-DK" sz="1100" dirty="0">
-                  <a:latin typeface="Times New Roman" panose="02020603050405020304" pitchFamily="18" charset="0"/>
-                  <a:cs typeface="Times New Roman" panose="02020603050405020304" pitchFamily="18" charset="0"/>
-                </a:endParaRPr>
-              </a:p>
-            </p:txBody>
-          </p:sp>
-        </mc:Choice>
-        <mc:Fallback>
-          <p:sp>
-            <p:nvSpPr>
-              <p:cNvPr id="103" name="TextBox 102">
-                <a:extLst>
-                  <a:ext uri="{FF2B5EF4-FFF2-40B4-BE49-F238E27FC236}">
-                    <a16:creationId xmlns:a16="http://schemas.microsoft.com/office/drawing/2014/main" id="{5C409916-F4A5-6BB1-30A3-D5D74208D15F}"/>
-                  </a:ext>
-                </a:extLst>
-              </p:cNvPr>
-              <p:cNvSpPr txBox="1">
-                <a:spLocks noRot="1" noChangeAspect="1" noMove="1" noResize="1" noEditPoints="1" noAdjustHandles="1" noChangeArrowheads="1" noChangeShapeType="1" noTextEdit="1"/>
-              </p:cNvSpPr>
-              <p:nvPr/>
-            </p:nvSpPr>
-            <p:spPr>
-              <a:xfrm>
-                <a:off x="2411656" y="6184149"/>
-                <a:ext cx="725519" cy="305789"/>
-              </a:xfrm>
-              <a:prstGeom prst="rect">
-                <a:avLst/>
-              </a:prstGeom>
-              <a:blipFill>
-                <a:blip r:embed="rId22"/>
-                <a:stretch>
-                  <a:fillRect/>
-                </a:stretch>
-              </a:blipFill>
-            </p:spPr>
-            <p:txBody>
-              <a:bodyPr/>
-              <a:lstStyle/>
-              <a:p>
-                <a:r>
-                  <a:rPr lang="da-DK">
-                    <a:noFill/>
-                  </a:rPr>
-                  <a:t> </a:t>
-                </a:r>
-              </a:p>
-            </p:txBody>
-          </p:sp>
-        </mc:Fallback>
-      </mc:AlternateContent>
       <p:cxnSp>
         <p:nvCxnSpPr>
           <p:cNvPr id="106" name="Straight Connector 105">
@@ -8285,7 +7407,7 @@
         </p:nvCxnSpPr>
         <p:spPr>
           <a:xfrm rot="5400000" flipV="1">
-            <a:off x="664351" y="5803775"/>
+            <a:off x="756496" y="5803775"/>
             <a:ext cx="0" cy="85906"/>
           </a:xfrm>
           <a:prstGeom prst="line">
@@ -8328,7 +7450,7 @@
         </p:nvCxnSpPr>
         <p:spPr>
           <a:xfrm rot="5400000" flipV="1">
-            <a:off x="659032" y="6503751"/>
+            <a:off x="751177" y="6174145"/>
             <a:ext cx="0" cy="85906"/>
           </a:xfrm>
           <a:prstGeom prst="line">
@@ -8371,7 +7493,7 @@
         </p:nvCxnSpPr>
         <p:spPr>
           <a:xfrm rot="5400000" flipV="1">
-            <a:off x="669670" y="7175369"/>
+            <a:off x="761815" y="7175369"/>
             <a:ext cx="0" cy="85906"/>
           </a:xfrm>
           <a:prstGeom prst="line">
@@ -8414,8 +7536,8 @@
             </p:nvSpPr>
             <p:spPr>
               <a:xfrm>
-                <a:off x="271330" y="5762090"/>
-                <a:ext cx="307455" cy="169277"/>
+                <a:off x="561946" y="5758383"/>
+                <a:ext cx="113814" cy="169277"/>
               </a:xfrm>
               <a:prstGeom prst="rect">
                 <a:avLst/>
@@ -8438,13 +7560,7 @@
                         <a:rPr lang="da-DK" sz="1100" i="1">
                           <a:latin typeface="Cambria Math" panose="02040503050406030204" pitchFamily="18" charset="0"/>
                         </a:rPr>
-                        <m:t>0 </m:t>
-                      </m:r>
-                      <m:r>
-                        <a:rPr lang="da-DK" sz="1100" i="1">
-                          <a:latin typeface="Cambria Math" panose="02040503050406030204" pitchFamily="18" charset="0"/>
-                        </a:rPr>
-                        <m:t>𝑒𝑉</m:t>
+                        <m:t>0</m:t>
                       </m:r>
                     </m:oMath>
                   </m:oMathPara>
@@ -8474,16 +7590,16 @@
             </p:nvSpPr>
             <p:spPr>
               <a:xfrm>
-                <a:off x="271330" y="5762090"/>
-                <a:ext cx="307455" cy="169277"/>
+                <a:off x="561946" y="5758383"/>
+                <a:ext cx="113814" cy="169277"/>
               </a:xfrm>
               <a:prstGeom prst="rect">
                 <a:avLst/>
               </a:prstGeom>
               <a:blipFill>
-                <a:blip r:embed="rId17"/>
+                <a:blip r:embed="rId7"/>
                 <a:stretch>
-                  <a:fillRect l="-8000" r="-8000" b="-33333"/>
+                  <a:fillRect l="-30000" r="-20000" b="-14286"/>
                 </a:stretch>
               </a:blipFill>
             </p:spPr>
@@ -8518,8 +7634,8 @@
         </p:nvCxnSpPr>
         <p:spPr>
           <a:xfrm flipV="1">
-            <a:off x="2776254" y="5917191"/>
-            <a:ext cx="0" cy="228429"/>
+            <a:off x="2868399" y="5874662"/>
+            <a:ext cx="0" cy="309600"/>
           </a:xfrm>
           <a:prstGeom prst="straightConnector1">
             <a:avLst/>
@@ -8563,7 +7679,7 @@
             </p:nvSpPr>
             <p:spPr>
               <a:xfrm>
-                <a:off x="2836955" y="5963730"/>
+                <a:off x="2929100" y="5963730"/>
                 <a:ext cx="135806" cy="169277"/>
               </a:xfrm>
               <a:prstGeom prst="rect">
@@ -8617,16 +7733,16 @@
             </p:nvSpPr>
             <p:spPr>
               <a:xfrm>
-                <a:off x="2836955" y="5963730"/>
+                <a:off x="2929100" y="5963730"/>
                 <a:ext cx="135806" cy="169277"/>
               </a:xfrm>
               <a:prstGeom prst="rect">
                 <a:avLst/>
               </a:prstGeom>
               <a:blipFill>
-                <a:blip r:embed="rId20"/>
+                <a:blip r:embed="rId15"/>
                 <a:stretch>
-                  <a:fillRect l="-25000" r="-16667" b="-14286"/>
+                  <a:fillRect l="-16667" r="-16667" b="-14286"/>
                 </a:stretch>
               </a:blipFill>
             </p:spPr>
@@ -8661,8 +7777,8 @@
         </p:nvCxnSpPr>
         <p:spPr>
           <a:xfrm flipH="1" flipV="1">
-            <a:off x="4382040" y="6546704"/>
-            <a:ext cx="70" cy="603512"/>
+            <a:off x="4474185" y="6504176"/>
+            <a:ext cx="70" cy="680400"/>
           </a:xfrm>
           <a:prstGeom prst="straightConnector1">
             <a:avLst/>
@@ -8706,7 +7822,7 @@
             </p:nvSpPr>
             <p:spPr>
               <a:xfrm>
-                <a:off x="4438131" y="6753885"/>
+                <a:off x="4523188" y="6753885"/>
                 <a:ext cx="244811" cy="169277"/>
               </a:xfrm>
               <a:prstGeom prst="rect">
@@ -8766,16 +7882,16 @@
             </p:nvSpPr>
             <p:spPr>
               <a:xfrm>
-                <a:off x="4438131" y="6753885"/>
+                <a:off x="4523188" y="6753885"/>
                 <a:ext cx="244811" cy="169277"/>
               </a:xfrm>
               <a:prstGeom prst="rect">
                 <a:avLst/>
               </a:prstGeom>
               <a:blipFill>
-                <a:blip r:embed="rId23"/>
+                <a:blip r:embed="rId16"/>
                 <a:stretch>
-                  <a:fillRect l="-10000" r="-10000" b="-40000"/>
+                  <a:fillRect l="-15000" r="-10000" b="-40000"/>
                 </a:stretch>
               </a:blipFill>
             </p:spPr>
@@ -8810,7 +7926,7 @@
         </p:nvCxnSpPr>
         <p:spPr>
           <a:xfrm>
-            <a:off x="2479054" y="5846729"/>
+            <a:off x="2571199" y="5846729"/>
             <a:ext cx="623389" cy="0"/>
           </a:xfrm>
           <a:prstGeom prst="line">
@@ -8854,7 +7970,7 @@
         </p:nvCxnSpPr>
         <p:spPr>
           <a:xfrm>
-            <a:off x="4047058" y="6470507"/>
+            <a:off x="4139203" y="6470507"/>
             <a:ext cx="623389" cy="0"/>
           </a:xfrm>
           <a:prstGeom prst="line">
@@ -8896,7 +8012,7 @@
         </p:nvSpPr>
         <p:spPr>
           <a:xfrm>
-            <a:off x="1771450" y="48244"/>
+            <a:off x="1863595" y="48244"/>
             <a:ext cx="2133918" cy="261610"/>
           </a:xfrm>
           <a:prstGeom prst="rect">
@@ -8934,7 +8050,7 @@
         </p:nvCxnSpPr>
         <p:spPr>
           <a:xfrm>
-            <a:off x="4372246" y="5875083"/>
+            <a:off x="4464391" y="5875083"/>
             <a:ext cx="0" cy="548032"/>
           </a:xfrm>
           <a:prstGeom prst="straightConnector1">
@@ -8942,7 +8058,9 @@
           </a:prstGeom>
           <a:ln w="12700">
             <a:solidFill>
-              <a:srgbClr val="FF0000"/>
+              <a:schemeClr val="bg2">
+                <a:lumMod val="75000"/>
+              </a:schemeClr>
             </a:solidFill>
             <a:headEnd type="triangle" w="med" len="med"/>
             <a:tailEnd type="triangle" w="med" len="med"/>
@@ -8979,7 +8097,7 @@
         </p:nvCxnSpPr>
         <p:spPr>
           <a:xfrm>
-            <a:off x="4047058" y="5846728"/>
+            <a:off x="4139203" y="5846728"/>
             <a:ext cx="623389" cy="0"/>
           </a:xfrm>
           <a:prstGeom prst="line">
@@ -8987,7 +8105,9 @@
           </a:prstGeom>
           <a:ln w="12700">
             <a:solidFill>
-              <a:srgbClr val="FF0000"/>
+              <a:schemeClr val="bg2">
+                <a:lumMod val="75000"/>
+              </a:schemeClr>
             </a:solidFill>
             <a:prstDash val="sysDot"/>
           </a:ln>
@@ -9007,47 +8127,6 @@
           </a:fontRef>
         </p:style>
       </p:cxnSp>
-      <p:sp>
-        <p:nvSpPr>
-          <p:cNvPr id="131" name="TextBox 130">
-            <a:extLst>
-              <a:ext uri="{FF2B5EF4-FFF2-40B4-BE49-F238E27FC236}">
-                <a16:creationId xmlns:a16="http://schemas.microsoft.com/office/drawing/2014/main" id="{4CF0D82B-D95C-1F49-D8C7-A1D87E15A124}"/>
-              </a:ext>
-            </a:extLst>
-          </p:cNvPr>
-          <p:cNvSpPr txBox="1"/>
-          <p:nvPr/>
-        </p:nvSpPr>
-        <p:spPr>
-          <a:xfrm>
-            <a:off x="4353171" y="5914662"/>
-            <a:ext cx="707270" cy="430887"/>
-          </a:xfrm>
-          <a:prstGeom prst="rect">
-            <a:avLst/>
-          </a:prstGeom>
-          <a:noFill/>
-        </p:spPr>
-        <p:txBody>
-          <a:bodyPr wrap="square" rtlCol="0">
-            <a:spAutoFit/>
-          </a:bodyPr>
-          <a:lstStyle/>
-          <a:p>
-            <a:r>
-              <a:rPr lang="da-DK" sz="1100" dirty="0">
-                <a:solidFill>
-                  <a:srgbClr val="FF0000"/>
-                </a:solidFill>
-                <a:latin typeface="Times New Roman" panose="02020603050405020304" pitchFamily="18" charset="0"/>
-                <a:cs typeface="Times New Roman" panose="02020603050405020304" pitchFamily="18" charset="0"/>
-              </a:rPr>
-              <a:t>Over-potential</a:t>
-            </a:r>
-          </a:p>
-        </p:txBody>
-      </p:sp>
       <p:sp>
         <p:nvSpPr>
           <p:cNvPr id="132" name="TextBox 131">
@@ -9062,7 +8141,7 @@
         </p:nvSpPr>
         <p:spPr>
           <a:xfrm>
-            <a:off x="1868796" y="2697674"/>
+            <a:off x="1960941" y="2697674"/>
             <a:ext cx="2117887" cy="261610"/>
           </a:xfrm>
           <a:prstGeom prst="rect">
@@ -9100,7 +8179,7 @@
         </p:nvSpPr>
         <p:spPr>
           <a:xfrm>
-            <a:off x="1868795" y="5290982"/>
+            <a:off x="1960940" y="5290982"/>
             <a:ext cx="2172390" cy="261610"/>
           </a:xfrm>
           <a:prstGeom prst="rect">
@@ -9140,15 +8219,17 @@
         </p:nvCxnSpPr>
         <p:spPr>
           <a:xfrm>
-            <a:off x="3903774" y="3249676"/>
-            <a:ext cx="0" cy="759988"/>
+            <a:off x="4472607" y="3269602"/>
+            <a:ext cx="0" cy="745200"/>
           </a:xfrm>
           <a:prstGeom prst="straightConnector1">
             <a:avLst/>
           </a:prstGeom>
           <a:ln w="12700">
             <a:solidFill>
-              <a:srgbClr val="FF0000"/>
+              <a:schemeClr val="bg2">
+                <a:lumMod val="75000"/>
+              </a:schemeClr>
             </a:solidFill>
             <a:headEnd type="triangle" w="med" len="med"/>
             <a:tailEnd type="triangle" w="med" len="med"/>
@@ -9169,12 +8250,164 @@
           </a:fontRef>
         </p:style>
       </p:cxnSp>
+      <mc:AlternateContent xmlns:mc="http://schemas.openxmlformats.org/markup-compatibility/2006">
+        <mc:Choice xmlns:a14="http://schemas.microsoft.com/office/drawing/2010/main" Requires="a14">
+          <p:sp>
+            <p:nvSpPr>
+              <p:cNvPr id="135" name="TextBox 134">
+                <a:extLst>
+                  <a:ext uri="{FF2B5EF4-FFF2-40B4-BE49-F238E27FC236}">
+                    <a16:creationId xmlns:a16="http://schemas.microsoft.com/office/drawing/2014/main" id="{43368C16-EF62-F3D8-66BF-4B560617549E}"/>
+                  </a:ext>
+                </a:extLst>
+              </p:cNvPr>
+              <p:cNvSpPr txBox="1"/>
+              <p:nvPr/>
+            </p:nvSpPr>
+            <p:spPr>
+              <a:xfrm>
+                <a:off x="4304561" y="3541019"/>
+                <a:ext cx="810870" cy="261610"/>
+              </a:xfrm>
+              <a:prstGeom prst="rect">
+                <a:avLst/>
+              </a:prstGeom>
+              <a:noFill/>
+            </p:spPr>
+            <p:txBody>
+              <a:bodyPr wrap="square" rtlCol="0">
+                <a:spAutoFit/>
+              </a:bodyPr>
+              <a:lstStyle/>
+              <a:p>
+                <a14:m>
+                  <m:oMathPara xmlns:m="http://schemas.openxmlformats.org/officeDocument/2006/math">
+                    <m:oMathParaPr>
+                      <m:jc m:val="centerGroup"/>
+                    </m:oMathParaPr>
+                    <m:oMath xmlns:m="http://schemas.openxmlformats.org/officeDocument/2006/math">
+                      <m:sSub>
+                        <m:sSubPr>
+                          <m:ctrlPr>
+                            <a:rPr lang="da-DK" sz="1100" b="0" i="1" smtClean="0">
+                              <a:solidFill>
+                                <a:schemeClr val="bg2">
+                                  <a:lumMod val="75000"/>
+                                </a:schemeClr>
+                              </a:solidFill>
+                              <a:latin typeface="Cambria Math" panose="02040503050406030204" pitchFamily="18" charset="0"/>
+                              <a:cs typeface="Times New Roman" panose="02020603050405020304" pitchFamily="18" charset="0"/>
+                            </a:rPr>
+                          </m:ctrlPr>
+                        </m:sSubPr>
+                        <m:e>
+                          <m:r>
+                            <a:rPr lang="da-DK" sz="1100" b="0" i="1" smtClean="0">
+                              <a:solidFill>
+                                <a:schemeClr val="bg2">
+                                  <a:lumMod val="75000"/>
+                                </a:schemeClr>
+                              </a:solidFill>
+                              <a:latin typeface="Cambria Math" panose="02040503050406030204" pitchFamily="18" charset="0"/>
+                              <a:cs typeface="Times New Roman" panose="02020603050405020304" pitchFamily="18" charset="0"/>
+                            </a:rPr>
+                            <m:t>2 </m:t>
+                          </m:r>
+                          <m:r>
+                            <a:rPr lang="da-DK" sz="1100" b="0" i="1" smtClean="0">
+                              <a:solidFill>
+                                <a:schemeClr val="bg2">
+                                  <a:lumMod val="75000"/>
+                                </a:schemeClr>
+                              </a:solidFill>
+                              <a:latin typeface="Cambria Math" panose="02040503050406030204" pitchFamily="18" charset="0"/>
+                              <a:cs typeface="Times New Roman" panose="02020603050405020304" pitchFamily="18" charset="0"/>
+                            </a:rPr>
+                            <m:t>𝑈</m:t>
+                          </m:r>
+                        </m:e>
+                        <m:sub>
+                          <m:r>
+                            <a:rPr lang="da-DK" sz="1100" b="0" i="1" smtClean="0">
+                              <a:solidFill>
+                                <a:schemeClr val="bg2">
+                                  <a:lumMod val="75000"/>
+                                </a:schemeClr>
+                              </a:solidFill>
+                              <a:latin typeface="Cambria Math" panose="02040503050406030204" pitchFamily="18" charset="0"/>
+                              <a:cs typeface="Times New Roman" panose="02020603050405020304" pitchFamily="18" charset="0"/>
+                            </a:rPr>
+                            <m:t>𝑂𝑃</m:t>
+                          </m:r>
+                        </m:sub>
+                      </m:sSub>
+                    </m:oMath>
+                  </m:oMathPara>
+                </a14:m>
+                <a:endParaRPr lang="da-DK" sz="1100" dirty="0">
+                  <a:solidFill>
+                    <a:schemeClr val="bg2">
+                      <a:lumMod val="75000"/>
+                    </a:schemeClr>
+                  </a:solidFill>
+                  <a:latin typeface="Times New Roman" panose="02020603050405020304" pitchFamily="18" charset="0"/>
+                  <a:cs typeface="Times New Roman" panose="02020603050405020304" pitchFamily="18" charset="0"/>
+                </a:endParaRPr>
+              </a:p>
+            </p:txBody>
+          </p:sp>
+        </mc:Choice>
+        <mc:Fallback>
+          <p:sp>
+            <p:nvSpPr>
+              <p:cNvPr id="135" name="TextBox 134">
+                <a:extLst>
+                  <a:ext uri="{FF2B5EF4-FFF2-40B4-BE49-F238E27FC236}">
+                    <a16:creationId xmlns:a16="http://schemas.microsoft.com/office/drawing/2014/main" id="{43368C16-EF62-F3D8-66BF-4B560617549E}"/>
+                  </a:ext>
+                </a:extLst>
+              </p:cNvPr>
+              <p:cNvSpPr txBox="1">
+                <a:spLocks noRot="1" noChangeAspect="1" noMove="1" noResize="1" noEditPoints="1" noAdjustHandles="1" noChangeArrowheads="1" noChangeShapeType="1" noTextEdit="1"/>
+              </p:cNvSpPr>
+              <p:nvPr/>
+            </p:nvSpPr>
+            <p:spPr>
+              <a:xfrm>
+                <a:off x="4304561" y="3541019"/>
+                <a:ext cx="810870" cy="261610"/>
+              </a:xfrm>
+              <a:prstGeom prst="rect">
+                <a:avLst/>
+              </a:prstGeom>
+              <a:blipFill>
+                <a:blip r:embed="rId17"/>
+                <a:stretch>
+                  <a:fillRect b="-9091"/>
+                </a:stretch>
+              </a:blipFill>
+            </p:spPr>
+            <p:txBody>
+              <a:bodyPr/>
+              <a:lstStyle/>
+              <a:p>
+                <a:r>
+                  <a:rPr lang="da-DK">
+                    <a:noFill/>
+                  </a:rPr>
+                  <a:t> </a:t>
+                </a:r>
+              </a:p>
+            </p:txBody>
+          </p:sp>
+        </mc:Fallback>
+      </mc:AlternateContent>
       <p:sp>
         <p:nvSpPr>
-          <p:cNvPr id="135" name="TextBox 134">
+          <p:cNvPr id="144" name="TextBox 143">
             <a:extLst>
               <a:ext uri="{FF2B5EF4-FFF2-40B4-BE49-F238E27FC236}">
-                <a16:creationId xmlns:a16="http://schemas.microsoft.com/office/drawing/2014/main" id="{43368C16-EF62-F3D8-66BF-4B560617549E}"/>
+                <a16:creationId xmlns:a16="http://schemas.microsoft.com/office/drawing/2014/main" id="{1AF0B4E1-EA87-CB98-0BA5-09776F53AB1E}"/>
               </a:ext>
             </a:extLst>
           </p:cNvPr>
@@ -9183,8 +8416,8 @@
         </p:nvSpPr>
         <p:spPr>
           <a:xfrm>
-            <a:off x="3385445" y="3465696"/>
-            <a:ext cx="1036659" cy="261610"/>
+            <a:off x="226258" y="77808"/>
+            <a:ext cx="274434" cy="307777"/>
           </a:xfrm>
           <a:prstGeom prst="rect">
             <a:avLst/>
@@ -9192,24 +8425,992 @@
           <a:noFill/>
         </p:spPr>
         <p:txBody>
-          <a:bodyPr wrap="square" rtlCol="0">
+          <a:bodyPr wrap="none" rtlCol="0">
             <a:spAutoFit/>
           </a:bodyPr>
           <a:lstStyle/>
           <a:p>
             <a:r>
-              <a:rPr lang="da-DK" sz="1100" dirty="0">
-                <a:solidFill>
-                  <a:srgbClr val="FF0000"/>
-                </a:solidFill>
+              <a:rPr lang="da-DK" sz="1400" b="1" dirty="0">
                 <a:latin typeface="Times New Roman" panose="02020603050405020304" pitchFamily="18" charset="0"/>
                 <a:cs typeface="Times New Roman" panose="02020603050405020304" pitchFamily="18" charset="0"/>
               </a:rPr>
-              <a:t>Overpotentiale</a:t>
+              <a:t>a</a:t>
             </a:r>
           </a:p>
         </p:txBody>
       </p:sp>
+      <mc:AlternateContent xmlns:mc="http://schemas.openxmlformats.org/markup-compatibility/2006">
+        <mc:Choice xmlns:a14="http://schemas.microsoft.com/office/drawing/2010/main" Requires="a14">
+          <p:sp>
+            <p:nvSpPr>
+              <p:cNvPr id="145" name="TextBox 144">
+                <a:extLst>
+                  <a:ext uri="{FF2B5EF4-FFF2-40B4-BE49-F238E27FC236}">
+                    <a16:creationId xmlns:a16="http://schemas.microsoft.com/office/drawing/2014/main" id="{8E3AB3AB-ADDA-CD14-E2C5-AD5A6A571A67}"/>
+                  </a:ext>
+                </a:extLst>
+              </p:cNvPr>
+              <p:cNvSpPr txBox="1"/>
+              <p:nvPr/>
+            </p:nvSpPr>
+            <p:spPr>
+              <a:xfrm>
+                <a:off x="2520902" y="4338315"/>
+                <a:ext cx="723981" cy="298095"/>
+              </a:xfrm>
+              <a:prstGeom prst="rect">
+                <a:avLst/>
+              </a:prstGeom>
+              <a:noFill/>
+            </p:spPr>
+            <p:txBody>
+              <a:bodyPr wrap="none" rtlCol="0">
+                <a:spAutoFit/>
+              </a:bodyPr>
+              <a:lstStyle/>
+              <a:p>
+                <a14:m>
+                  <m:oMathPara xmlns:m="http://schemas.openxmlformats.org/officeDocument/2006/math">
+                    <m:oMathParaPr>
+                      <m:jc m:val="centerGroup"/>
+                    </m:oMathParaPr>
+                    <m:oMath xmlns:m="http://schemas.openxmlformats.org/officeDocument/2006/math">
+                      <m:r>
+                        <m:rPr>
+                          <m:sty m:val="p"/>
+                        </m:rPr>
+                        <a:rPr lang="da-DK" sz="1100" smtClean="0">
+                          <a:latin typeface="Cambria Math" panose="02040503050406030204" pitchFamily="18" charset="0"/>
+                        </a:rPr>
+                        <m:t>Δ</m:t>
+                      </m:r>
+                      <m:sSubSup>
+                        <m:sSubSupPr>
+                          <m:ctrlPr>
+                            <a:rPr lang="da-DK" sz="1100" i="1">
+                              <a:latin typeface="Cambria Math" panose="02040503050406030204" pitchFamily="18" charset="0"/>
+                            </a:rPr>
+                          </m:ctrlPr>
+                        </m:sSubSupPr>
+                        <m:e>
+                          <m:r>
+                            <a:rPr lang="da-DK" sz="1100" i="1">
+                              <a:latin typeface="Cambria Math" panose="02040503050406030204" pitchFamily="18" charset="0"/>
+                            </a:rPr>
+                            <m:t>𝐺</m:t>
+                          </m:r>
+                        </m:e>
+                        <m:sub>
+                          <m:sPre>
+                            <m:sPrePr>
+                              <m:ctrlPr>
+                                <a:rPr lang="da-DK" sz="1100" i="1" smtClean="0">
+                                  <a:latin typeface="Cambria Math" panose="02040503050406030204" pitchFamily="18" charset="0"/>
+                                </a:rPr>
+                              </m:ctrlPr>
+                            </m:sPrePr>
+                            <m:sub>
+                              <m:r>
+                                <a:rPr lang="da-DK" sz="1100" b="0" i="1" smtClean="0">
+                                  <a:latin typeface="Cambria Math" panose="02040503050406030204" pitchFamily="18" charset="0"/>
+                                </a:rPr>
+                                <m:t> </m:t>
+                              </m:r>
+                            </m:sub>
+                            <m:sup>
+                              <m:r>
+                                <a:rPr lang="da-DK" sz="1100" b="0" i="1" smtClean="0">
+                                  <a:latin typeface="Cambria Math" panose="02040503050406030204" pitchFamily="18" charset="0"/>
+                                </a:rPr>
+                                <m:t>∗</m:t>
+                              </m:r>
+                            </m:sup>
+                            <m:e>
+                              <m:r>
+                                <a:rPr lang="da-DK" sz="1100" b="0" i="1" smtClean="0">
+                                  <a:latin typeface="Cambria Math" panose="02040503050406030204" pitchFamily="18" charset="0"/>
+                                </a:rPr>
+                                <m:t>𝐶𝑂𝑂𝐻</m:t>
+                              </m:r>
+                            </m:e>
+                          </m:sPre>
+                        </m:sub>
+                        <m:sup>
+                          <m:r>
+                            <a:rPr lang="da-DK" sz="1100" i="1">
+                              <a:latin typeface="Cambria Math" panose="02040503050406030204" pitchFamily="18" charset="0"/>
+                            </a:rPr>
+                            <m:t>𝐿𝑜𝑤</m:t>
+                          </m:r>
+                        </m:sup>
+                      </m:sSubSup>
+                    </m:oMath>
+                  </m:oMathPara>
+                </a14:m>
+                <a:endParaRPr lang="da-DK" sz="1100" dirty="0">
+                  <a:latin typeface="Times New Roman" panose="02020603050405020304" pitchFamily="18" charset="0"/>
+                  <a:cs typeface="Times New Roman" panose="02020603050405020304" pitchFamily="18" charset="0"/>
+                </a:endParaRPr>
+              </a:p>
+            </p:txBody>
+          </p:sp>
+        </mc:Choice>
+        <mc:Fallback>
+          <p:sp>
+            <p:nvSpPr>
+              <p:cNvPr id="145" name="TextBox 144">
+                <a:extLst>
+                  <a:ext uri="{FF2B5EF4-FFF2-40B4-BE49-F238E27FC236}">
+                    <a16:creationId xmlns:a16="http://schemas.microsoft.com/office/drawing/2014/main" id="{8E3AB3AB-ADDA-CD14-E2C5-AD5A6A571A67}"/>
+                  </a:ext>
+                </a:extLst>
+              </p:cNvPr>
+              <p:cNvSpPr txBox="1">
+                <a:spLocks noRot="1" noChangeAspect="1" noMove="1" noResize="1" noEditPoints="1" noAdjustHandles="1" noChangeArrowheads="1" noChangeShapeType="1" noTextEdit="1"/>
+              </p:cNvSpPr>
+              <p:nvPr/>
+            </p:nvSpPr>
+            <p:spPr>
+              <a:xfrm>
+                <a:off x="2520902" y="4338315"/>
+                <a:ext cx="723981" cy="298095"/>
+              </a:xfrm>
+              <a:prstGeom prst="rect">
+                <a:avLst/>
+              </a:prstGeom>
+              <a:blipFill>
+                <a:blip r:embed="rId18"/>
+                <a:stretch>
+                  <a:fillRect b="-4000"/>
+                </a:stretch>
+              </a:blipFill>
+            </p:spPr>
+            <p:txBody>
+              <a:bodyPr/>
+              <a:lstStyle/>
+              <a:p>
+                <a:r>
+                  <a:rPr lang="da-DK">
+                    <a:noFill/>
+                  </a:rPr>
+                  <a:t> </a:t>
+                </a:r>
+              </a:p>
+            </p:txBody>
+          </p:sp>
+        </mc:Fallback>
+      </mc:AlternateContent>
+      <mc:AlternateContent xmlns:mc="http://schemas.openxmlformats.org/markup-compatibility/2006">
+        <mc:Choice xmlns:a14="http://schemas.microsoft.com/office/drawing/2010/main" Requires="a14">
+          <p:sp>
+            <p:nvSpPr>
+              <p:cNvPr id="147" name="TextBox 146">
+                <a:extLst>
+                  <a:ext uri="{FF2B5EF4-FFF2-40B4-BE49-F238E27FC236}">
+                    <a16:creationId xmlns:a16="http://schemas.microsoft.com/office/drawing/2014/main" id="{F38C5C83-A3FC-337F-4DE3-905A1305777B}"/>
+                  </a:ext>
+                </a:extLst>
+              </p:cNvPr>
+              <p:cNvSpPr txBox="1"/>
+              <p:nvPr/>
+            </p:nvSpPr>
+            <p:spPr>
+              <a:xfrm>
+                <a:off x="2492059" y="6204187"/>
+                <a:ext cx="723980" cy="325667"/>
+              </a:xfrm>
+              <a:prstGeom prst="rect">
+                <a:avLst/>
+              </a:prstGeom>
+              <a:noFill/>
+            </p:spPr>
+            <p:txBody>
+              <a:bodyPr wrap="none" rtlCol="0">
+                <a:spAutoFit/>
+              </a:bodyPr>
+              <a:lstStyle/>
+              <a:p>
+                <a14:m>
+                  <m:oMathPara xmlns:m="http://schemas.openxmlformats.org/officeDocument/2006/math">
+                    <m:oMathParaPr>
+                      <m:jc m:val="centerGroup"/>
+                    </m:oMathParaPr>
+                    <m:oMath xmlns:m="http://schemas.openxmlformats.org/officeDocument/2006/math">
+                      <m:r>
+                        <m:rPr>
+                          <m:sty m:val="p"/>
+                        </m:rPr>
+                        <a:rPr lang="da-DK" sz="1100" smtClean="0">
+                          <a:latin typeface="Cambria Math" panose="02040503050406030204" pitchFamily="18" charset="0"/>
+                        </a:rPr>
+                        <m:t>Δ</m:t>
+                      </m:r>
+                      <m:sSubSup>
+                        <m:sSubSupPr>
+                          <m:ctrlPr>
+                            <a:rPr lang="da-DK" sz="1100" i="1">
+                              <a:latin typeface="Cambria Math" panose="02040503050406030204" pitchFamily="18" charset="0"/>
+                            </a:rPr>
+                          </m:ctrlPr>
+                        </m:sSubSupPr>
+                        <m:e>
+                          <m:r>
+                            <a:rPr lang="da-DK" sz="1100" i="1">
+                              <a:latin typeface="Cambria Math" panose="02040503050406030204" pitchFamily="18" charset="0"/>
+                            </a:rPr>
+                            <m:t>𝐺</m:t>
+                          </m:r>
+                        </m:e>
+                        <m:sub>
+                          <m:sPre>
+                            <m:sPrePr>
+                              <m:ctrlPr>
+                                <a:rPr lang="da-DK" sz="1100" i="1" smtClean="0">
+                                  <a:latin typeface="Cambria Math" panose="02040503050406030204" pitchFamily="18" charset="0"/>
+                                </a:rPr>
+                              </m:ctrlPr>
+                            </m:sPrePr>
+                            <m:sub>
+                              <m:r>
+                                <a:rPr lang="da-DK" sz="1100" b="0" i="1" smtClean="0">
+                                  <a:latin typeface="Cambria Math" panose="02040503050406030204" pitchFamily="18" charset="0"/>
+                                </a:rPr>
+                                <m:t> </m:t>
+                              </m:r>
+                            </m:sub>
+                            <m:sup>
+                              <m:r>
+                                <a:rPr lang="da-DK" sz="1100" b="0" i="1" smtClean="0">
+                                  <a:latin typeface="Cambria Math" panose="02040503050406030204" pitchFamily="18" charset="0"/>
+                                </a:rPr>
+                                <m:t>∗</m:t>
+                              </m:r>
+                            </m:sup>
+                            <m:e>
+                              <m:r>
+                                <a:rPr lang="da-DK" sz="1100" b="0" i="1" smtClean="0">
+                                  <a:latin typeface="Cambria Math" panose="02040503050406030204" pitchFamily="18" charset="0"/>
+                                </a:rPr>
+                                <m:t>𝐶𝑂𝑂𝐻</m:t>
+                              </m:r>
+                            </m:e>
+                          </m:sPre>
+                        </m:sub>
+                        <m:sup>
+                          <m:r>
+                            <a:rPr lang="da-DK" sz="1100" b="0" i="1" smtClean="0">
+                              <a:latin typeface="Cambria Math" panose="02040503050406030204" pitchFamily="18" charset="0"/>
+                            </a:rPr>
+                            <m:t>𝐻𝑖𝑔h</m:t>
+                          </m:r>
+                        </m:sup>
+                      </m:sSubSup>
+                    </m:oMath>
+                  </m:oMathPara>
+                </a14:m>
+                <a:endParaRPr lang="da-DK" sz="1100" dirty="0">
+                  <a:latin typeface="Times New Roman" panose="02020603050405020304" pitchFamily="18" charset="0"/>
+                  <a:cs typeface="Times New Roman" panose="02020603050405020304" pitchFamily="18" charset="0"/>
+                </a:endParaRPr>
+              </a:p>
+            </p:txBody>
+          </p:sp>
+        </mc:Choice>
+        <mc:Fallback>
+          <p:sp>
+            <p:nvSpPr>
+              <p:cNvPr id="147" name="TextBox 146">
+                <a:extLst>
+                  <a:ext uri="{FF2B5EF4-FFF2-40B4-BE49-F238E27FC236}">
+                    <a16:creationId xmlns:a16="http://schemas.microsoft.com/office/drawing/2014/main" id="{F38C5C83-A3FC-337F-4DE3-905A1305777B}"/>
+                  </a:ext>
+                </a:extLst>
+              </p:cNvPr>
+              <p:cNvSpPr txBox="1">
+                <a:spLocks noRot="1" noChangeAspect="1" noMove="1" noResize="1" noEditPoints="1" noAdjustHandles="1" noChangeArrowheads="1" noChangeShapeType="1" noTextEdit="1"/>
+              </p:cNvSpPr>
+              <p:nvPr/>
+            </p:nvSpPr>
+            <p:spPr>
+              <a:xfrm>
+                <a:off x="2492059" y="6204187"/>
+                <a:ext cx="723980" cy="325667"/>
+              </a:xfrm>
+              <a:prstGeom prst="rect">
+                <a:avLst/>
+              </a:prstGeom>
+              <a:blipFill>
+                <a:blip r:embed="rId19"/>
+                <a:stretch>
+                  <a:fillRect b="-3704"/>
+                </a:stretch>
+              </a:blipFill>
+            </p:spPr>
+            <p:txBody>
+              <a:bodyPr/>
+              <a:lstStyle/>
+              <a:p>
+                <a:r>
+                  <a:rPr lang="da-DK">
+                    <a:noFill/>
+                  </a:rPr>
+                  <a:t> </a:t>
+                </a:r>
+              </a:p>
+            </p:txBody>
+          </p:sp>
+        </mc:Fallback>
+      </mc:AlternateContent>
+      <mc:AlternateContent xmlns:mc="http://schemas.openxmlformats.org/markup-compatibility/2006">
+        <mc:Choice xmlns:a14="http://schemas.microsoft.com/office/drawing/2010/main" Requires="a14">
+          <p:sp>
+            <p:nvSpPr>
+              <p:cNvPr id="148" name="TextBox 147">
+                <a:extLst>
+                  <a:ext uri="{FF2B5EF4-FFF2-40B4-BE49-F238E27FC236}">
+                    <a16:creationId xmlns:a16="http://schemas.microsoft.com/office/drawing/2014/main" id="{268DE17E-2B7D-CD63-CADF-F5A145EB2365}"/>
+                  </a:ext>
+                </a:extLst>
+              </p:cNvPr>
+              <p:cNvSpPr txBox="1"/>
+              <p:nvPr/>
+            </p:nvSpPr>
+            <p:spPr>
+              <a:xfrm>
+                <a:off x="2459558" y="1287368"/>
+                <a:ext cx="824649" cy="324576"/>
+              </a:xfrm>
+              <a:prstGeom prst="rect">
+                <a:avLst/>
+              </a:prstGeom>
+              <a:noFill/>
+            </p:spPr>
+            <p:txBody>
+              <a:bodyPr wrap="none" rtlCol="0">
+                <a:spAutoFit/>
+              </a:bodyPr>
+              <a:lstStyle/>
+              <a:p>
+                <a14:m>
+                  <m:oMathPara xmlns:m="http://schemas.openxmlformats.org/officeDocument/2006/math">
+                    <m:oMathParaPr>
+                      <m:jc m:val="centerGroup"/>
+                    </m:oMathParaPr>
+                    <m:oMath xmlns:m="http://schemas.openxmlformats.org/officeDocument/2006/math">
+                      <m:r>
+                        <m:rPr>
+                          <m:sty m:val="p"/>
+                        </m:rPr>
+                        <a:rPr lang="da-DK" sz="1100" smtClean="0">
+                          <a:latin typeface="Cambria Math" panose="02040503050406030204" pitchFamily="18" charset="0"/>
+                        </a:rPr>
+                        <m:t>Δ</m:t>
+                      </m:r>
+                      <m:sSubSup>
+                        <m:sSubSupPr>
+                          <m:ctrlPr>
+                            <a:rPr lang="da-DK" sz="1100" i="1">
+                              <a:latin typeface="Cambria Math" panose="02040503050406030204" pitchFamily="18" charset="0"/>
+                            </a:rPr>
+                          </m:ctrlPr>
+                        </m:sSubSupPr>
+                        <m:e>
+                          <m:r>
+                            <a:rPr lang="da-DK" sz="1100" i="1">
+                              <a:latin typeface="Cambria Math" panose="02040503050406030204" pitchFamily="18" charset="0"/>
+                            </a:rPr>
+                            <m:t>𝐺</m:t>
+                          </m:r>
+                        </m:e>
+                        <m:sub>
+                          <m:sPre>
+                            <m:sPrePr>
+                              <m:ctrlPr>
+                                <a:rPr lang="da-DK" sz="1100" i="1" smtClean="0">
+                                  <a:latin typeface="Cambria Math" panose="02040503050406030204" pitchFamily="18" charset="0"/>
+                                </a:rPr>
+                              </m:ctrlPr>
+                            </m:sPrePr>
+                            <m:sub>
+                              <m:r>
+                                <a:rPr lang="da-DK" sz="1100" b="0" i="1" smtClean="0">
+                                  <a:latin typeface="Cambria Math" panose="02040503050406030204" pitchFamily="18" charset="0"/>
+                                </a:rPr>
+                                <m:t> </m:t>
+                              </m:r>
+                            </m:sub>
+                            <m:sup>
+                              <m:r>
+                                <a:rPr lang="da-DK" sz="1100" b="0" i="1" smtClean="0">
+                                  <a:latin typeface="Cambria Math" panose="02040503050406030204" pitchFamily="18" charset="0"/>
+                                </a:rPr>
+                                <m:t>∗</m:t>
+                              </m:r>
+                            </m:sup>
+                            <m:e>
+                              <m:r>
+                                <a:rPr lang="da-DK" sz="1100" b="0" i="1" smtClean="0">
+                                  <a:latin typeface="Cambria Math" panose="02040503050406030204" pitchFamily="18" charset="0"/>
+                                </a:rPr>
+                                <m:t>𝐶𝑂𝑂𝐻</m:t>
+                              </m:r>
+                            </m:e>
+                          </m:sPre>
+                        </m:sub>
+                        <m:sup>
+                          <m:r>
+                            <a:rPr lang="da-DK" sz="1100" b="0" i="1" smtClean="0">
+                              <a:latin typeface="Cambria Math" panose="02040503050406030204" pitchFamily="18" charset="0"/>
+                            </a:rPr>
+                            <m:t>𝑂𝑝𝑡𝑖𝑚𝑎𝑙</m:t>
+                          </m:r>
+                        </m:sup>
+                      </m:sSubSup>
+                    </m:oMath>
+                  </m:oMathPara>
+                </a14:m>
+                <a:endParaRPr lang="da-DK" sz="1100" dirty="0">
+                  <a:latin typeface="Times New Roman" panose="02020603050405020304" pitchFamily="18" charset="0"/>
+                  <a:cs typeface="Times New Roman" panose="02020603050405020304" pitchFamily="18" charset="0"/>
+                </a:endParaRPr>
+              </a:p>
+            </p:txBody>
+          </p:sp>
+        </mc:Choice>
+        <mc:Fallback>
+          <p:sp>
+            <p:nvSpPr>
+              <p:cNvPr id="148" name="TextBox 147">
+                <a:extLst>
+                  <a:ext uri="{FF2B5EF4-FFF2-40B4-BE49-F238E27FC236}">
+                    <a16:creationId xmlns:a16="http://schemas.microsoft.com/office/drawing/2014/main" id="{268DE17E-2B7D-CD63-CADF-F5A145EB2365}"/>
+                  </a:ext>
+                </a:extLst>
+              </p:cNvPr>
+              <p:cNvSpPr txBox="1">
+                <a:spLocks noRot="1" noChangeAspect="1" noMove="1" noResize="1" noEditPoints="1" noAdjustHandles="1" noChangeArrowheads="1" noChangeShapeType="1" noTextEdit="1"/>
+              </p:cNvSpPr>
+              <p:nvPr/>
+            </p:nvSpPr>
+            <p:spPr>
+              <a:xfrm>
+                <a:off x="2459558" y="1287368"/>
+                <a:ext cx="824649" cy="324576"/>
+              </a:xfrm>
+              <a:prstGeom prst="rect">
+                <a:avLst/>
+              </a:prstGeom>
+              <a:blipFill>
+                <a:blip r:embed="rId20"/>
+                <a:stretch>
+                  <a:fillRect b="-7692"/>
+                </a:stretch>
+              </a:blipFill>
+            </p:spPr>
+            <p:txBody>
+              <a:bodyPr/>
+              <a:lstStyle/>
+              <a:p>
+                <a:r>
+                  <a:rPr lang="da-DK">
+                    <a:noFill/>
+                  </a:rPr>
+                  <a:t> </a:t>
+                </a:r>
+              </a:p>
+            </p:txBody>
+          </p:sp>
+        </mc:Fallback>
+      </mc:AlternateContent>
+      <mc:AlternateContent xmlns:mc="http://schemas.openxmlformats.org/markup-compatibility/2006">
+        <mc:Choice xmlns:a14="http://schemas.microsoft.com/office/drawing/2010/main" Requires="a14">
+          <p:sp>
+            <p:nvSpPr>
+              <p:cNvPr id="149" name="TextBox 148">
+                <a:extLst>
+                  <a:ext uri="{FF2B5EF4-FFF2-40B4-BE49-F238E27FC236}">
+                    <a16:creationId xmlns:a16="http://schemas.microsoft.com/office/drawing/2014/main" id="{EAF65E00-0A40-5648-2C55-D7A8FB4F97F4}"/>
+                  </a:ext>
+                </a:extLst>
+              </p:cNvPr>
+              <p:cNvSpPr txBox="1"/>
+              <p:nvPr/>
+            </p:nvSpPr>
+            <p:spPr>
+              <a:xfrm rot="16200000">
+                <a:off x="143760" y="3778379"/>
+                <a:ext cx="505395" cy="169277"/>
+              </a:xfrm>
+              <a:prstGeom prst="rect">
+                <a:avLst/>
+              </a:prstGeom>
+              <a:noFill/>
+            </p:spPr>
+            <p:txBody>
+              <a:bodyPr wrap="none" lIns="0" tIns="0" rIns="0" bIns="0" rtlCol="0">
+                <a:spAutoFit/>
+              </a:bodyPr>
+              <a:lstStyle/>
+              <a:p>
+                <a14:m>
+                  <m:oMath xmlns:m="http://schemas.openxmlformats.org/officeDocument/2006/math">
+                    <m:r>
+                      <m:rPr>
+                        <m:sty m:val="p"/>
+                      </m:rPr>
+                      <a:rPr lang="da-DK" sz="1100" smtClean="0">
+                        <a:latin typeface="Cambria Math" panose="02040503050406030204" pitchFamily="18" charset="0"/>
+                      </a:rPr>
+                      <m:t>Δ</m:t>
+                    </m:r>
+                    <m:r>
+                      <a:rPr lang="da-DK" sz="1100" i="1">
+                        <a:latin typeface="Cambria Math" panose="02040503050406030204" pitchFamily="18" charset="0"/>
+                      </a:rPr>
+                      <m:t>𝐺</m:t>
+                    </m:r>
+                    <m:r>
+                      <a:rPr lang="da-DK" sz="1100" b="0" i="1" smtClean="0">
+                        <a:latin typeface="Cambria Math" panose="02040503050406030204" pitchFamily="18" charset="0"/>
+                      </a:rPr>
+                      <m:t> </m:t>
+                    </m:r>
+                    <m:d>
+                      <m:dPr>
+                        <m:begChr m:val="["/>
+                        <m:endChr m:val="]"/>
+                        <m:ctrlPr>
+                          <a:rPr lang="da-DK" sz="1100" b="0" i="1" smtClean="0">
+                            <a:latin typeface="Cambria Math" panose="02040503050406030204" pitchFamily="18" charset="0"/>
+                          </a:rPr>
+                        </m:ctrlPr>
+                      </m:dPr>
+                      <m:e>
+                        <m:r>
+                          <a:rPr lang="da-DK" sz="1100" b="0" i="1" smtClean="0">
+                            <a:latin typeface="Cambria Math" panose="02040503050406030204" pitchFamily="18" charset="0"/>
+                          </a:rPr>
+                          <m:t>𝑒𝑉</m:t>
+                        </m:r>
+                      </m:e>
+                    </m:d>
+                  </m:oMath>
+                </a14:m>
+                <a:r>
+                  <a:rPr lang="da-DK" sz="1100" dirty="0">
+                    <a:latin typeface="Times New Roman" panose="02020603050405020304" pitchFamily="18" charset="0"/>
+                    <a:cs typeface="Times New Roman" panose="02020603050405020304" pitchFamily="18" charset="0"/>
+                  </a:rPr>
+                  <a:t> </a:t>
+                </a:r>
+              </a:p>
+            </p:txBody>
+          </p:sp>
+        </mc:Choice>
+        <mc:Fallback>
+          <p:sp>
+            <p:nvSpPr>
+              <p:cNvPr id="149" name="TextBox 148">
+                <a:extLst>
+                  <a:ext uri="{FF2B5EF4-FFF2-40B4-BE49-F238E27FC236}">
+                    <a16:creationId xmlns:a16="http://schemas.microsoft.com/office/drawing/2014/main" id="{EAF65E00-0A40-5648-2C55-D7A8FB4F97F4}"/>
+                  </a:ext>
+                </a:extLst>
+              </p:cNvPr>
+              <p:cNvSpPr txBox="1">
+                <a:spLocks noRot="1" noChangeAspect="1" noMove="1" noResize="1" noEditPoints="1" noAdjustHandles="1" noChangeArrowheads="1" noChangeShapeType="1" noTextEdit="1"/>
+              </p:cNvSpPr>
+              <p:nvPr/>
+            </p:nvSpPr>
+            <p:spPr>
+              <a:xfrm rot="16200000">
+                <a:off x="143760" y="3778379"/>
+                <a:ext cx="505395" cy="169277"/>
+              </a:xfrm>
+              <a:prstGeom prst="rect">
+                <a:avLst/>
+              </a:prstGeom>
+              <a:blipFill>
+                <a:blip r:embed="rId21"/>
+                <a:stretch>
+                  <a:fillRect r="-42857" b="-10000"/>
+                </a:stretch>
+              </a:blipFill>
+            </p:spPr>
+            <p:txBody>
+              <a:bodyPr/>
+              <a:lstStyle/>
+              <a:p>
+                <a:r>
+                  <a:rPr lang="da-DK">
+                    <a:noFill/>
+                  </a:rPr>
+                  <a:t> </a:t>
+                </a:r>
+              </a:p>
+            </p:txBody>
+          </p:sp>
+        </mc:Fallback>
+      </mc:AlternateContent>
+      <mc:AlternateContent xmlns:mc="http://schemas.openxmlformats.org/markup-compatibility/2006">
+        <mc:Choice xmlns:a14="http://schemas.microsoft.com/office/drawing/2010/main" Requires="a14">
+          <p:sp>
+            <p:nvSpPr>
+              <p:cNvPr id="150" name="TextBox 149">
+                <a:extLst>
+                  <a:ext uri="{FF2B5EF4-FFF2-40B4-BE49-F238E27FC236}">
+                    <a16:creationId xmlns:a16="http://schemas.microsoft.com/office/drawing/2014/main" id="{48C630E8-9E81-48DF-CAB2-F3EFD5D58B68}"/>
+                  </a:ext>
+                </a:extLst>
+              </p:cNvPr>
+              <p:cNvSpPr txBox="1"/>
+              <p:nvPr/>
+            </p:nvSpPr>
+            <p:spPr>
+              <a:xfrm rot="16200000">
+                <a:off x="143760" y="6423743"/>
+                <a:ext cx="505395" cy="169277"/>
+              </a:xfrm>
+              <a:prstGeom prst="rect">
+                <a:avLst/>
+              </a:prstGeom>
+              <a:noFill/>
+            </p:spPr>
+            <p:txBody>
+              <a:bodyPr wrap="none" lIns="0" tIns="0" rIns="0" bIns="0" rtlCol="0">
+                <a:spAutoFit/>
+              </a:bodyPr>
+              <a:lstStyle/>
+              <a:p>
+                <a14:m>
+                  <m:oMath xmlns:m="http://schemas.openxmlformats.org/officeDocument/2006/math">
+                    <m:r>
+                      <m:rPr>
+                        <m:sty m:val="p"/>
+                      </m:rPr>
+                      <a:rPr lang="da-DK" sz="1100" smtClean="0">
+                        <a:latin typeface="Cambria Math" panose="02040503050406030204" pitchFamily="18" charset="0"/>
+                      </a:rPr>
+                      <m:t>Δ</m:t>
+                    </m:r>
+                    <m:r>
+                      <a:rPr lang="da-DK" sz="1100" i="1">
+                        <a:latin typeface="Cambria Math" panose="02040503050406030204" pitchFamily="18" charset="0"/>
+                      </a:rPr>
+                      <m:t>𝐺</m:t>
+                    </m:r>
+                    <m:r>
+                      <a:rPr lang="da-DK" sz="1100" b="0" i="1" smtClean="0">
+                        <a:latin typeface="Cambria Math" panose="02040503050406030204" pitchFamily="18" charset="0"/>
+                      </a:rPr>
+                      <m:t> </m:t>
+                    </m:r>
+                    <m:d>
+                      <m:dPr>
+                        <m:begChr m:val="["/>
+                        <m:endChr m:val="]"/>
+                        <m:ctrlPr>
+                          <a:rPr lang="da-DK" sz="1100" b="0" i="1" smtClean="0">
+                            <a:latin typeface="Cambria Math" panose="02040503050406030204" pitchFamily="18" charset="0"/>
+                          </a:rPr>
+                        </m:ctrlPr>
+                      </m:dPr>
+                      <m:e>
+                        <m:r>
+                          <a:rPr lang="da-DK" sz="1100" b="0" i="1" smtClean="0">
+                            <a:latin typeface="Cambria Math" panose="02040503050406030204" pitchFamily="18" charset="0"/>
+                          </a:rPr>
+                          <m:t>𝑒𝑉</m:t>
+                        </m:r>
+                      </m:e>
+                    </m:d>
+                  </m:oMath>
+                </a14:m>
+                <a:r>
+                  <a:rPr lang="da-DK" sz="1100" dirty="0">
+                    <a:latin typeface="Times New Roman" panose="02020603050405020304" pitchFamily="18" charset="0"/>
+                    <a:cs typeface="Times New Roman" panose="02020603050405020304" pitchFamily="18" charset="0"/>
+                  </a:rPr>
+                  <a:t> </a:t>
+                </a:r>
+              </a:p>
+            </p:txBody>
+          </p:sp>
+        </mc:Choice>
+        <mc:Fallback>
+          <p:sp>
+            <p:nvSpPr>
+              <p:cNvPr id="150" name="TextBox 149">
+                <a:extLst>
+                  <a:ext uri="{FF2B5EF4-FFF2-40B4-BE49-F238E27FC236}">
+                    <a16:creationId xmlns:a16="http://schemas.microsoft.com/office/drawing/2014/main" id="{48C630E8-9E81-48DF-CAB2-F3EFD5D58B68}"/>
+                  </a:ext>
+                </a:extLst>
+              </p:cNvPr>
+              <p:cNvSpPr txBox="1">
+                <a:spLocks noRot="1" noChangeAspect="1" noMove="1" noResize="1" noEditPoints="1" noAdjustHandles="1" noChangeArrowheads="1" noChangeShapeType="1" noTextEdit="1"/>
+              </p:cNvSpPr>
+              <p:nvPr/>
+            </p:nvSpPr>
+            <p:spPr>
+              <a:xfrm rot="16200000">
+                <a:off x="143760" y="6423743"/>
+                <a:ext cx="505395" cy="169277"/>
+              </a:xfrm>
+              <a:prstGeom prst="rect">
+                <a:avLst/>
+              </a:prstGeom>
+              <a:blipFill>
+                <a:blip r:embed="rId22"/>
+                <a:stretch>
+                  <a:fillRect r="-42857" b="-9756"/>
+                </a:stretch>
+              </a:blipFill>
+            </p:spPr>
+            <p:txBody>
+              <a:bodyPr/>
+              <a:lstStyle/>
+              <a:p>
+                <a:r>
+                  <a:rPr lang="da-DK">
+                    <a:noFill/>
+                  </a:rPr>
+                  <a:t> </a:t>
+                </a:r>
+              </a:p>
+            </p:txBody>
+          </p:sp>
+        </mc:Fallback>
+      </mc:AlternateContent>
+      <p:sp>
+        <p:nvSpPr>
+          <p:cNvPr id="151" name="TextBox 150">
+            <a:extLst>
+              <a:ext uri="{FF2B5EF4-FFF2-40B4-BE49-F238E27FC236}">
+                <a16:creationId xmlns:a16="http://schemas.microsoft.com/office/drawing/2014/main" id="{0CFB95F4-ACB4-5B9F-D391-952100F48C89}"/>
+              </a:ext>
+            </a:extLst>
+          </p:cNvPr>
+          <p:cNvSpPr txBox="1"/>
+          <p:nvPr/>
+        </p:nvSpPr>
+        <p:spPr>
+          <a:xfrm>
+            <a:off x="197044" y="2834353"/>
+            <a:ext cx="284052" cy="307777"/>
+          </a:xfrm>
+          <a:prstGeom prst="rect">
+            <a:avLst/>
+          </a:prstGeom>
+          <a:noFill/>
+        </p:spPr>
+        <p:txBody>
+          <a:bodyPr wrap="none" rtlCol="0">
+            <a:spAutoFit/>
+          </a:bodyPr>
+          <a:lstStyle/>
+          <a:p>
+            <a:r>
+              <a:rPr lang="da-DK" sz="1400" b="1" dirty="0">
+                <a:latin typeface="Times New Roman" panose="02020603050405020304" pitchFamily="18" charset="0"/>
+                <a:cs typeface="Times New Roman" panose="02020603050405020304" pitchFamily="18" charset="0"/>
+              </a:rPr>
+              <a:t>b</a:t>
+            </a:r>
+          </a:p>
+        </p:txBody>
+      </p:sp>
+      <p:sp>
+        <p:nvSpPr>
+          <p:cNvPr id="152" name="TextBox 151">
+            <a:extLst>
+              <a:ext uri="{FF2B5EF4-FFF2-40B4-BE49-F238E27FC236}">
+                <a16:creationId xmlns:a16="http://schemas.microsoft.com/office/drawing/2014/main" id="{DBA0B84A-F8EC-4B94-E89B-57CE9FF56656}"/>
+              </a:ext>
+            </a:extLst>
+          </p:cNvPr>
+          <p:cNvSpPr txBox="1"/>
+          <p:nvPr/>
+        </p:nvSpPr>
+        <p:spPr>
+          <a:xfrm>
+            <a:off x="188068" y="5455012"/>
+            <a:ext cx="264816" cy="307777"/>
+          </a:xfrm>
+          <a:prstGeom prst="rect">
+            <a:avLst/>
+          </a:prstGeom>
+          <a:noFill/>
+        </p:spPr>
+        <p:txBody>
+          <a:bodyPr wrap="none" rtlCol="0">
+            <a:spAutoFit/>
+          </a:bodyPr>
+          <a:lstStyle/>
+          <a:p>
+            <a:r>
+              <a:rPr lang="da-DK" sz="1400" b="1" dirty="0">
+                <a:latin typeface="Times New Roman" panose="02020603050405020304" pitchFamily="18" charset="0"/>
+                <a:cs typeface="Times New Roman" panose="02020603050405020304" pitchFamily="18" charset="0"/>
+              </a:rPr>
+              <a:t>c</a:t>
+            </a:r>
+          </a:p>
+        </p:txBody>
+      </p:sp>
+      <mc:AlternateContent xmlns:mc="http://schemas.openxmlformats.org/markup-compatibility/2006">
+        <mc:Choice xmlns:a14="http://schemas.microsoft.com/office/drawing/2010/main" Requires="a14">
+          <p:sp>
+            <p:nvSpPr>
+              <p:cNvPr id="153" name="TextBox 152">
+                <a:extLst>
+                  <a:ext uri="{FF2B5EF4-FFF2-40B4-BE49-F238E27FC236}">
+                    <a16:creationId xmlns:a16="http://schemas.microsoft.com/office/drawing/2014/main" id="{5DF81A25-859C-FF55-39E5-4E89DCCC4A8C}"/>
+                  </a:ext>
+                </a:extLst>
+              </p:cNvPr>
+              <p:cNvSpPr txBox="1"/>
+              <p:nvPr/>
+            </p:nvSpPr>
+            <p:spPr>
+              <a:xfrm>
+                <a:off x="4276985" y="6019142"/>
+                <a:ext cx="810870" cy="261610"/>
+              </a:xfrm>
+              <a:prstGeom prst="rect">
+                <a:avLst/>
+              </a:prstGeom>
+              <a:noFill/>
+            </p:spPr>
+            <p:txBody>
+              <a:bodyPr wrap="square" rtlCol="0">
+                <a:spAutoFit/>
+              </a:bodyPr>
+              <a:lstStyle/>
+              <a:p>
+                <a14:m>
+                  <m:oMathPara xmlns:m="http://schemas.openxmlformats.org/officeDocument/2006/math">
+                    <m:oMathParaPr>
+                      <m:jc m:val="centerGroup"/>
+                    </m:oMathParaPr>
+                    <m:oMath xmlns:m="http://schemas.openxmlformats.org/officeDocument/2006/math">
+                      <m:sSub>
+                        <m:sSubPr>
+                          <m:ctrlPr>
+                            <a:rPr lang="da-DK" sz="1100" b="0" i="1" smtClean="0">
+                              <a:solidFill>
+                                <a:schemeClr val="bg2">
+                                  <a:lumMod val="75000"/>
+                                </a:schemeClr>
+                              </a:solidFill>
+                              <a:latin typeface="Cambria Math" panose="02040503050406030204" pitchFamily="18" charset="0"/>
+                              <a:cs typeface="Times New Roman" panose="02020603050405020304" pitchFamily="18" charset="0"/>
+                            </a:rPr>
+                          </m:ctrlPr>
+                        </m:sSubPr>
+                        <m:e>
+                          <m:r>
+                            <a:rPr lang="da-DK" sz="1100" b="0" i="1" smtClean="0">
+                              <a:solidFill>
+                                <a:schemeClr val="bg2">
+                                  <a:lumMod val="75000"/>
+                                </a:schemeClr>
+                              </a:solidFill>
+                              <a:latin typeface="Cambria Math" panose="02040503050406030204" pitchFamily="18" charset="0"/>
+                              <a:cs typeface="Times New Roman" panose="02020603050405020304" pitchFamily="18" charset="0"/>
+                            </a:rPr>
+                            <m:t>2 </m:t>
+                          </m:r>
+                          <m:r>
+                            <a:rPr lang="da-DK" sz="1100" b="0" i="1" smtClean="0">
+                              <a:solidFill>
+                                <a:schemeClr val="bg2">
+                                  <a:lumMod val="75000"/>
+                                </a:schemeClr>
+                              </a:solidFill>
+                              <a:latin typeface="Cambria Math" panose="02040503050406030204" pitchFamily="18" charset="0"/>
+                              <a:cs typeface="Times New Roman" panose="02020603050405020304" pitchFamily="18" charset="0"/>
+                            </a:rPr>
+                            <m:t>𝑈</m:t>
+                          </m:r>
+                        </m:e>
+                        <m:sub>
+                          <m:r>
+                            <a:rPr lang="da-DK" sz="1100" b="0" i="1" smtClean="0">
+                              <a:solidFill>
+                                <a:schemeClr val="bg2">
+                                  <a:lumMod val="75000"/>
+                                </a:schemeClr>
+                              </a:solidFill>
+                              <a:latin typeface="Cambria Math" panose="02040503050406030204" pitchFamily="18" charset="0"/>
+                              <a:cs typeface="Times New Roman" panose="02020603050405020304" pitchFamily="18" charset="0"/>
+                            </a:rPr>
+                            <m:t>𝑂𝑃</m:t>
+                          </m:r>
+                        </m:sub>
+                      </m:sSub>
+                    </m:oMath>
+                  </m:oMathPara>
+                </a14:m>
+                <a:endParaRPr lang="da-DK" sz="1100" dirty="0">
+                  <a:solidFill>
+                    <a:schemeClr val="bg2">
+                      <a:lumMod val="75000"/>
+                    </a:schemeClr>
+                  </a:solidFill>
+                  <a:latin typeface="Times New Roman" panose="02020603050405020304" pitchFamily="18" charset="0"/>
+                  <a:cs typeface="Times New Roman" panose="02020603050405020304" pitchFamily="18" charset="0"/>
+                </a:endParaRPr>
+              </a:p>
+            </p:txBody>
+          </p:sp>
+        </mc:Choice>
+        <mc:Fallback>
+          <p:sp>
+            <p:nvSpPr>
+              <p:cNvPr id="153" name="TextBox 152">
+                <a:extLst>
+                  <a:ext uri="{FF2B5EF4-FFF2-40B4-BE49-F238E27FC236}">
+                    <a16:creationId xmlns:a16="http://schemas.microsoft.com/office/drawing/2014/main" id="{5DF81A25-859C-FF55-39E5-4E89DCCC4A8C}"/>
+                  </a:ext>
+                </a:extLst>
+              </p:cNvPr>
+              <p:cNvSpPr txBox="1">
+                <a:spLocks noRot="1" noChangeAspect="1" noMove="1" noResize="1" noEditPoints="1" noAdjustHandles="1" noChangeArrowheads="1" noChangeShapeType="1" noTextEdit="1"/>
+              </p:cNvSpPr>
+              <p:nvPr/>
+            </p:nvSpPr>
+            <p:spPr>
+              <a:xfrm>
+                <a:off x="4276985" y="6019142"/>
+                <a:ext cx="810870" cy="261610"/>
+              </a:xfrm>
+              <a:prstGeom prst="rect">
+                <a:avLst/>
+              </a:prstGeom>
+              <a:blipFill>
+                <a:blip r:embed="rId23"/>
+                <a:stretch>
+                  <a:fillRect b="-9091"/>
+                </a:stretch>
+              </a:blipFill>
+            </p:spPr>
+            <p:txBody>
+              <a:bodyPr/>
+              <a:lstStyle/>
+              <a:p>
+                <a:r>
+                  <a:rPr lang="da-DK">
+                    <a:noFill/>
+                  </a:rPr>
+                  <a:t> </a:t>
+                </a:r>
+              </a:p>
+            </p:txBody>
+          </p:sp>
+        </mc:Fallback>
+      </mc:AlternateContent>
     </p:spTree>
     <p:extLst>
       <p:ext uri="{BB962C8B-B14F-4D97-AF65-F5344CB8AC3E}">

</xml_diff>

<commit_message>
Fixed everything + writing up to page 7
</commit_message>
<xml_diff>
--- a/Writing/Thesis_Figures/FAOR Free Energy Diagram.pptx
+++ b/Writing/Thesis_Figures/FAOR Free Energy Diagram.pptx
@@ -197,7 +197,7 @@
           <a:p>
             <a:fld id="{89BDC947-2A07-8441-81D9-42FB9F55DB14}" type="datetimeFigureOut">
               <a:rPr lang="da-DK" smtClean="0"/>
-              <a:t>07.09.2023</a:t>
+              <a:t>20.10.2023</a:t>
             </a:fld>
             <a:endParaRPr lang="da-DK"/>
           </a:p>
@@ -901,7 +901,7 @@
           <a:p>
             <a:fld id="{9E050B99-BD43-494D-ACCA-0701BF01488C}" type="datetimeFigureOut">
               <a:rPr lang="da-DK" smtClean="0"/>
-              <a:t>07.09.2023</a:t>
+              <a:t>20.10.2023</a:t>
             </a:fld>
             <a:endParaRPr lang="da-DK"/>
           </a:p>
@@ -1071,7 +1071,7 @@
           <a:p>
             <a:fld id="{9E050B99-BD43-494D-ACCA-0701BF01488C}" type="datetimeFigureOut">
               <a:rPr lang="da-DK" smtClean="0"/>
-              <a:t>07.09.2023</a:t>
+              <a:t>20.10.2023</a:t>
             </a:fld>
             <a:endParaRPr lang="da-DK"/>
           </a:p>
@@ -1251,7 +1251,7 @@
           <a:p>
             <a:fld id="{9E050B99-BD43-494D-ACCA-0701BF01488C}" type="datetimeFigureOut">
               <a:rPr lang="da-DK" smtClean="0"/>
-              <a:t>07.09.2023</a:t>
+              <a:t>20.10.2023</a:t>
             </a:fld>
             <a:endParaRPr lang="da-DK"/>
           </a:p>
@@ -1421,7 +1421,7 @@
           <a:p>
             <a:fld id="{9E050B99-BD43-494D-ACCA-0701BF01488C}" type="datetimeFigureOut">
               <a:rPr lang="da-DK" smtClean="0"/>
-              <a:t>07.09.2023</a:t>
+              <a:t>20.10.2023</a:t>
             </a:fld>
             <a:endParaRPr lang="da-DK"/>
           </a:p>
@@ -1665,7 +1665,7 @@
           <a:p>
             <a:fld id="{9E050B99-BD43-494D-ACCA-0701BF01488C}" type="datetimeFigureOut">
               <a:rPr lang="da-DK" smtClean="0"/>
-              <a:t>07.09.2023</a:t>
+              <a:t>20.10.2023</a:t>
             </a:fld>
             <a:endParaRPr lang="da-DK"/>
           </a:p>
@@ -1897,7 +1897,7 @@
           <a:p>
             <a:fld id="{9E050B99-BD43-494D-ACCA-0701BF01488C}" type="datetimeFigureOut">
               <a:rPr lang="da-DK" smtClean="0"/>
-              <a:t>07.09.2023</a:t>
+              <a:t>20.10.2023</a:t>
             </a:fld>
             <a:endParaRPr lang="da-DK"/>
           </a:p>
@@ -2264,7 +2264,7 @@
           <a:p>
             <a:fld id="{9E050B99-BD43-494D-ACCA-0701BF01488C}" type="datetimeFigureOut">
               <a:rPr lang="da-DK" smtClean="0"/>
-              <a:t>07.09.2023</a:t>
+              <a:t>20.10.2023</a:t>
             </a:fld>
             <a:endParaRPr lang="da-DK"/>
           </a:p>
@@ -2382,7 +2382,7 @@
           <a:p>
             <a:fld id="{9E050B99-BD43-494D-ACCA-0701BF01488C}" type="datetimeFigureOut">
               <a:rPr lang="da-DK" smtClean="0"/>
-              <a:t>07.09.2023</a:t>
+              <a:t>20.10.2023</a:t>
             </a:fld>
             <a:endParaRPr lang="da-DK"/>
           </a:p>
@@ -2477,7 +2477,7 @@
           <a:p>
             <a:fld id="{9E050B99-BD43-494D-ACCA-0701BF01488C}" type="datetimeFigureOut">
               <a:rPr lang="da-DK" smtClean="0"/>
-              <a:t>07.09.2023</a:t>
+              <a:t>20.10.2023</a:t>
             </a:fld>
             <a:endParaRPr lang="da-DK"/>
           </a:p>
@@ -2754,7 +2754,7 @@
           <a:p>
             <a:fld id="{9E050B99-BD43-494D-ACCA-0701BF01488C}" type="datetimeFigureOut">
               <a:rPr lang="da-DK" smtClean="0"/>
-              <a:t>07.09.2023</a:t>
+              <a:t>20.10.2023</a:t>
             </a:fld>
             <a:endParaRPr lang="da-DK"/>
           </a:p>
@@ -3011,7 +3011,7 @@
           <a:p>
             <a:fld id="{9E050B99-BD43-494D-ACCA-0701BF01488C}" type="datetimeFigureOut">
               <a:rPr lang="da-DK" smtClean="0"/>
-              <a:t>07.09.2023</a:t>
+              <a:t>20.10.2023</a:t>
             </a:fld>
             <a:endParaRPr lang="da-DK"/>
           </a:p>
@@ -3224,7 +3224,7 @@
           <a:p>
             <a:fld id="{9E050B99-BD43-494D-ACCA-0701BF01488C}" type="datetimeFigureOut">
               <a:rPr lang="da-DK" smtClean="0"/>
-              <a:t>07.09.2023</a:t>
+              <a:t>20.10.2023</a:t>
             </a:fld>
             <a:endParaRPr lang="da-DK"/>
           </a:p>
@@ -4770,8 +4770,8 @@
           </a:fontRef>
         </p:style>
       </p:cxnSp>
-      <mc:AlternateContent xmlns:mc="http://schemas.openxmlformats.org/markup-compatibility/2006">
-        <mc:Choice xmlns:a14="http://schemas.microsoft.com/office/drawing/2010/main" Requires="a14">
+      <mc:AlternateContent xmlns:mc="http://schemas.openxmlformats.org/markup-compatibility/2006" xmlns:a14="http://schemas.microsoft.com/office/drawing/2010/main">
+        <mc:Choice Requires="a14">
           <p:sp>
             <p:nvSpPr>
               <p:cNvPr id="44" name="TextBox 43">
@@ -4824,7 +4824,7 @@
             </p:txBody>
           </p:sp>
         </mc:Choice>
-        <mc:Fallback>
+        <mc:Fallback xmlns="">
           <p:sp>
             <p:nvSpPr>
               <p:cNvPr id="44" name="TextBox 43">
@@ -5882,8 +5882,8 @@
           </a:fontRef>
         </p:style>
       </p:cxnSp>
-      <mc:AlternateContent xmlns:mc="http://schemas.openxmlformats.org/markup-compatibility/2006">
-        <mc:Choice xmlns:a14="http://schemas.microsoft.com/office/drawing/2010/main" Requires="a14">
+      <mc:AlternateContent xmlns:mc="http://schemas.openxmlformats.org/markup-compatibility/2006" xmlns:a14="http://schemas.microsoft.com/office/drawing/2010/main">
+        <mc:Choice Requires="a14">
           <p:sp>
             <p:nvSpPr>
               <p:cNvPr id="63" name="TextBox 62">
@@ -5936,7 +5936,7 @@
             </p:txBody>
           </p:sp>
         </mc:Choice>
-        <mc:Fallback>
+        <mc:Fallback xmlns="">
           <p:sp>
             <p:nvSpPr>
               <p:cNvPr id="63" name="TextBox 62">
@@ -6071,8 +6071,8 @@
           </a:fontRef>
         </p:style>
       </p:cxnSp>
-      <mc:AlternateContent xmlns:mc="http://schemas.openxmlformats.org/markup-compatibility/2006">
-        <mc:Choice xmlns:a14="http://schemas.microsoft.com/office/drawing/2010/main" Requires="a14">
+      <mc:AlternateContent xmlns:mc="http://schemas.openxmlformats.org/markup-compatibility/2006" xmlns:a14="http://schemas.microsoft.com/office/drawing/2010/main">
+        <mc:Choice Requires="a14">
           <p:sp>
             <p:nvSpPr>
               <p:cNvPr id="70" name="TextBox 69">
@@ -6152,7 +6152,7 @@
             </p:txBody>
           </p:sp>
         </mc:Choice>
-        <mc:Fallback>
+        <mc:Fallback xmlns="">
           <p:sp>
             <p:nvSpPr>
               <p:cNvPr id="70" name="TextBox 69">
@@ -6374,8 +6374,8 @@
           </a:fontRef>
         </p:style>
       </p:cxnSp>
-      <mc:AlternateContent xmlns:mc="http://schemas.openxmlformats.org/markup-compatibility/2006">
-        <mc:Choice xmlns:a14="http://schemas.microsoft.com/office/drawing/2010/main" Requires="a14">
+      <mc:AlternateContent xmlns:mc="http://schemas.openxmlformats.org/markup-compatibility/2006" xmlns:a14="http://schemas.microsoft.com/office/drawing/2010/main">
+        <mc:Choice Requires="a14">
           <p:sp>
             <p:nvSpPr>
               <p:cNvPr id="76" name="TextBox 75">
@@ -6447,7 +6447,7 @@
             </p:txBody>
           </p:sp>
         </mc:Choice>
-        <mc:Fallback>
+        <mc:Fallback xmlns="">
           <p:sp>
             <p:nvSpPr>
               <p:cNvPr id="76" name="TextBox 75">
@@ -6537,8 +6537,8 @@
           </a:fontRef>
         </p:style>
       </p:cxnSp>
-      <mc:AlternateContent xmlns:mc="http://schemas.openxmlformats.org/markup-compatibility/2006">
-        <mc:Choice xmlns:a14="http://schemas.microsoft.com/office/drawing/2010/main" Requires="a14">
+      <mc:AlternateContent xmlns:mc="http://schemas.openxmlformats.org/markup-compatibility/2006" xmlns:a14="http://schemas.microsoft.com/office/drawing/2010/main">
+        <mc:Choice Requires="a14">
           <p:sp>
             <p:nvSpPr>
               <p:cNvPr id="79" name="TextBox 78">
@@ -6616,7 +6616,7 @@
             </p:txBody>
           </p:sp>
         </mc:Choice>
-        <mc:Fallback>
+        <mc:Fallback xmlns="">
           <p:sp>
             <p:nvSpPr>
               <p:cNvPr id="79" name="TextBox 78">
@@ -7632,8 +7632,8 @@
           </a:fontRef>
         </p:style>
       </p:cxnSp>
-      <mc:AlternateContent xmlns:mc="http://schemas.openxmlformats.org/markup-compatibility/2006">
-        <mc:Choice xmlns:a14="http://schemas.microsoft.com/office/drawing/2010/main" Requires="a14">
+      <mc:AlternateContent xmlns:mc="http://schemas.openxmlformats.org/markup-compatibility/2006" xmlns:a14="http://schemas.microsoft.com/office/drawing/2010/main">
+        <mc:Choice Requires="a14">
           <p:sp>
             <p:nvSpPr>
               <p:cNvPr id="109" name="TextBox 108">
@@ -7686,7 +7686,7 @@
             </p:txBody>
           </p:sp>
         </mc:Choice>
-        <mc:Fallback>
+        <mc:Fallback xmlns="">
           <p:sp>
             <p:nvSpPr>
               <p:cNvPr id="109" name="TextBox 108">
@@ -7776,8 +7776,8 @@
           </a:fontRef>
         </p:style>
       </p:cxnSp>
-      <mc:AlternateContent xmlns:mc="http://schemas.openxmlformats.org/markup-compatibility/2006">
-        <mc:Choice xmlns:a14="http://schemas.microsoft.com/office/drawing/2010/main" Requires="a14">
+      <mc:AlternateContent xmlns:mc="http://schemas.openxmlformats.org/markup-compatibility/2006" xmlns:a14="http://schemas.microsoft.com/office/drawing/2010/main">
+        <mc:Choice Requires="a14">
           <p:sp>
             <p:nvSpPr>
               <p:cNvPr id="111" name="TextBox 110">
@@ -7849,7 +7849,7 @@
             </p:txBody>
           </p:sp>
         </mc:Choice>
-        <mc:Fallback>
+        <mc:Fallback xmlns="">
           <p:sp>
             <p:nvSpPr>
               <p:cNvPr id="111" name="TextBox 110">
@@ -7939,8 +7939,8 @@
           </a:fontRef>
         </p:style>
       </p:cxnSp>
-      <mc:AlternateContent xmlns:mc="http://schemas.openxmlformats.org/markup-compatibility/2006">
-        <mc:Choice xmlns:a14="http://schemas.microsoft.com/office/drawing/2010/main" Requires="a14">
+      <mc:AlternateContent xmlns:mc="http://schemas.openxmlformats.org/markup-compatibility/2006" xmlns:a14="http://schemas.microsoft.com/office/drawing/2010/main">
+        <mc:Choice Requires="a14">
           <p:sp>
             <p:nvSpPr>
               <p:cNvPr id="113" name="TextBox 112">
@@ -8018,7 +8018,7 @@
             </p:txBody>
           </p:sp>
         </mc:Choice>
-        <mc:Fallback>
+        <mc:Fallback xmlns="">
           <p:sp>
             <p:nvSpPr>
               <p:cNvPr id="113" name="TextBox 112">
@@ -8419,8 +8419,8 @@
             </p:nvSpPr>
             <p:spPr>
               <a:xfrm>
-                <a:off x="4304561" y="3541019"/>
-                <a:ext cx="810870" cy="276101"/>
+                <a:off x="4347089" y="3541019"/>
+                <a:ext cx="810870" cy="270459"/>
               </a:xfrm>
               <a:prstGeom prst="rect">
                 <a:avLst/>
@@ -8440,8 +8440,8 @@
                       <m:jc m:val="centerGroup"/>
                     </m:oMathParaPr>
                     <m:oMath xmlns:m="http://schemas.openxmlformats.org/officeDocument/2006/math">
-                      <m:sSub>
-                        <m:sSubPr>
+                      <m:sSubSup>
+                        <m:sSubSupPr>
                           <m:ctrlPr>
                             <a:rPr lang="da-DK" sz="1100" b="0" i="1" smtClean="0">
                               <a:solidFill>
@@ -8453,7 +8453,7 @@
                               <a:cs typeface="Times New Roman" panose="02020603050405020304" pitchFamily="18" charset="0"/>
                             </a:rPr>
                           </m:ctrlPr>
-                        </m:sSubPr>
+                        </m:sSubSupPr>
                         <m:e>
                           <m:r>
                             <a:rPr lang="da-DK" sz="1100" b="0" i="1" smtClean="0">
@@ -8491,53 +8491,24 @@
                               <a:latin typeface="Cambria Math" panose="02040503050406030204" pitchFamily="18" charset="0"/>
                               <a:cs typeface="Times New Roman" panose="02020603050405020304" pitchFamily="18" charset="0"/>
                             </a:rPr>
-                            <m:t>𝑂</m:t>
+                            <m:t>𝐴𝑛𝑜𝑑𝑒</m:t>
                           </m:r>
-                          <m:sSub>
-                            <m:sSubPr>
-                              <m:ctrlPr>
-                                <a:rPr lang="da-DK" sz="1100" b="0" i="1" smtClean="0">
-                                  <a:solidFill>
-                                    <a:schemeClr val="bg2">
-                                      <a:lumMod val="75000"/>
-                                    </a:schemeClr>
-                                  </a:solidFill>
-                                  <a:latin typeface="Cambria Math" panose="02040503050406030204" pitchFamily="18" charset="0"/>
-                                  <a:cs typeface="Times New Roman" panose="02020603050405020304" pitchFamily="18" charset="0"/>
-                                </a:rPr>
-                              </m:ctrlPr>
-                            </m:sSubPr>
-                            <m:e>
-                              <m:r>
-                                <a:rPr lang="da-DK" sz="1100" b="0" i="1" smtClean="0">
-                                  <a:solidFill>
-                                    <a:schemeClr val="bg2">
-                                      <a:lumMod val="75000"/>
-                                    </a:schemeClr>
-                                  </a:solidFill>
-                                  <a:latin typeface="Cambria Math" panose="02040503050406030204" pitchFamily="18" charset="0"/>
-                                  <a:cs typeface="Times New Roman" panose="02020603050405020304" pitchFamily="18" charset="0"/>
-                                </a:rPr>
-                                <m:t>𝑃</m:t>
-                              </m:r>
-                            </m:e>
-                            <m:sub>
-                              <m:r>
-                                <a:rPr lang="da-DK" sz="1100" b="0" i="1" smtClean="0">
-                                  <a:solidFill>
-                                    <a:schemeClr val="bg2">
-                                      <a:lumMod val="75000"/>
-                                    </a:schemeClr>
-                                  </a:solidFill>
-                                  <a:latin typeface="Cambria Math" panose="02040503050406030204" pitchFamily="18" charset="0"/>
-                                  <a:cs typeface="Times New Roman" panose="02020603050405020304" pitchFamily="18" charset="0"/>
-                                </a:rPr>
-                                <m:t>𝐴</m:t>
-                              </m:r>
-                            </m:sub>
-                          </m:sSub>
                         </m:sub>
-                      </m:sSub>
+                        <m:sup>
+                          <m:r>
+                            <a:rPr lang="da-DK" sz="1100" b="0" i="1" smtClean="0">
+                              <a:solidFill>
+                                <a:schemeClr val="bg2">
+                                  <a:lumMod val="75000"/>
+                                </a:schemeClr>
+                              </a:solidFill>
+                              <a:latin typeface="Cambria Math" panose="02040503050406030204" pitchFamily="18" charset="0"/>
+                              <a:cs typeface="Times New Roman" panose="02020603050405020304" pitchFamily="18" charset="0"/>
+                            </a:rPr>
+                            <m:t>𝑂𝑃</m:t>
+                          </m:r>
+                        </m:sup>
+                      </m:sSubSup>
                     </m:oMath>
                   </m:oMathPara>
                 </a14:m>
@@ -8571,8 +8542,8 @@
             </p:nvSpPr>
             <p:spPr>
               <a:xfrm>
-                <a:off x="4304561" y="3541019"/>
-                <a:ext cx="810870" cy="276101"/>
+                <a:off x="4347089" y="3541019"/>
+                <a:ext cx="810870" cy="270459"/>
               </a:xfrm>
               <a:prstGeom prst="rect">
                 <a:avLst/>
@@ -8580,7 +8551,7 @@
               <a:blipFill>
                 <a:blip r:embed="rId19"/>
                 <a:stretch>
-                  <a:fillRect/>
+                  <a:fillRect b="-9091"/>
                 </a:stretch>
               </a:blipFill>
             </p:spPr>
@@ -9475,8 +9446,8 @@
             </p:nvSpPr>
             <p:spPr>
               <a:xfrm>
-                <a:off x="4276985" y="6019142"/>
-                <a:ext cx="810870" cy="282898"/>
+                <a:off x="4347865" y="6019142"/>
+                <a:ext cx="810870" cy="270459"/>
               </a:xfrm>
               <a:prstGeom prst="rect">
                 <a:avLst/>
@@ -9496,8 +9467,8 @@
                       <m:jc m:val="centerGroup"/>
                     </m:oMathParaPr>
                     <m:oMath xmlns:m="http://schemas.openxmlformats.org/officeDocument/2006/math">
-                      <m:sSub>
-                        <m:sSubPr>
+                      <m:sSubSup>
+                        <m:sSubSupPr>
                           <m:ctrlPr>
                             <a:rPr lang="da-DK" sz="1100" b="0" i="1" smtClean="0">
                               <a:solidFill>
@@ -9509,7 +9480,7 @@
                               <a:cs typeface="Times New Roman" panose="02020603050405020304" pitchFamily="18" charset="0"/>
                             </a:rPr>
                           </m:ctrlPr>
-                        </m:sSubPr>
+                        </m:sSubSupPr>
                         <m:e>
                           <m:r>
                             <a:rPr lang="da-DK" sz="1100" b="0" i="1" smtClean="0">
@@ -9547,53 +9518,24 @@
                               <a:latin typeface="Cambria Math" panose="02040503050406030204" pitchFamily="18" charset="0"/>
                               <a:cs typeface="Times New Roman" panose="02020603050405020304" pitchFamily="18" charset="0"/>
                             </a:rPr>
-                            <m:t>𝑂</m:t>
+                            <m:t>𝐴𝑛𝑜𝑑𝑒</m:t>
                           </m:r>
-                          <m:sSub>
-                            <m:sSubPr>
-                              <m:ctrlPr>
-                                <a:rPr lang="da-DK" sz="1100" b="0" i="1" smtClean="0">
-                                  <a:solidFill>
-                                    <a:schemeClr val="bg2">
-                                      <a:lumMod val="75000"/>
-                                    </a:schemeClr>
-                                  </a:solidFill>
-                                  <a:latin typeface="Cambria Math" panose="02040503050406030204" pitchFamily="18" charset="0"/>
-                                  <a:cs typeface="Times New Roman" panose="02020603050405020304" pitchFamily="18" charset="0"/>
-                                </a:rPr>
-                              </m:ctrlPr>
-                            </m:sSubPr>
-                            <m:e>
-                              <m:r>
-                                <a:rPr lang="da-DK" sz="1100" b="0" i="1" smtClean="0">
-                                  <a:solidFill>
-                                    <a:schemeClr val="bg2">
-                                      <a:lumMod val="75000"/>
-                                    </a:schemeClr>
-                                  </a:solidFill>
-                                  <a:latin typeface="Cambria Math" panose="02040503050406030204" pitchFamily="18" charset="0"/>
-                                  <a:cs typeface="Times New Roman" panose="02020603050405020304" pitchFamily="18" charset="0"/>
-                                </a:rPr>
-                                <m:t>𝑃</m:t>
-                              </m:r>
-                            </m:e>
-                            <m:sub>
-                              <m:r>
-                                <a:rPr lang="da-DK" sz="1100" b="0" i="1" smtClean="0">
-                                  <a:solidFill>
-                                    <a:schemeClr val="bg2">
-                                      <a:lumMod val="75000"/>
-                                    </a:schemeClr>
-                                  </a:solidFill>
-                                  <a:latin typeface="Cambria Math" panose="02040503050406030204" pitchFamily="18" charset="0"/>
-                                  <a:cs typeface="Times New Roman" panose="02020603050405020304" pitchFamily="18" charset="0"/>
-                                </a:rPr>
-                                <m:t>𝐴</m:t>
-                              </m:r>
-                            </m:sub>
-                          </m:sSub>
                         </m:sub>
-                      </m:sSub>
+                        <m:sup>
+                          <m:r>
+                            <a:rPr lang="da-DK" sz="1100" b="0" i="1" smtClean="0">
+                              <a:solidFill>
+                                <a:schemeClr val="bg2">
+                                  <a:lumMod val="75000"/>
+                                </a:schemeClr>
+                              </a:solidFill>
+                              <a:latin typeface="Cambria Math" panose="02040503050406030204" pitchFamily="18" charset="0"/>
+                              <a:cs typeface="Times New Roman" panose="02020603050405020304" pitchFamily="18" charset="0"/>
+                            </a:rPr>
+                            <m:t>𝑂𝑃</m:t>
+                          </m:r>
+                        </m:sup>
+                      </m:sSubSup>
                     </m:oMath>
                   </m:oMathPara>
                 </a14:m>
@@ -9627,8 +9569,8 @@
             </p:nvSpPr>
             <p:spPr>
               <a:xfrm>
-                <a:off x="4276985" y="6019142"/>
-                <a:ext cx="810870" cy="282898"/>
+                <a:off x="4347865" y="6019142"/>
+                <a:ext cx="810870" cy="270459"/>
               </a:xfrm>
               <a:prstGeom prst="rect">
                 <a:avLst/>
@@ -9636,7 +9578,7 @@
               <a:blipFill>
                 <a:blip r:embed="rId25"/>
                 <a:stretch>
-                  <a:fillRect/>
+                  <a:fillRect b="-4348"/>
                 </a:stretch>
               </a:blipFill>
             </p:spPr>
@@ -9655,8 +9597,8 @@
           </p:sp>
         </mc:Fallback>
       </mc:AlternateContent>
-      <mc:AlternateContent xmlns:mc="http://schemas.openxmlformats.org/markup-compatibility/2006">
-        <mc:Choice xmlns:a14="http://schemas.microsoft.com/office/drawing/2010/main" Requires="a14">
+      <mc:AlternateContent xmlns:mc="http://schemas.openxmlformats.org/markup-compatibility/2006" xmlns:a14="http://schemas.microsoft.com/office/drawing/2010/main">
+        <mc:Choice Requires="a14">
           <p:sp>
             <p:nvSpPr>
               <p:cNvPr id="2" name="TextBox 1">
@@ -9721,7 +9663,7 @@
             </p:txBody>
           </p:sp>
         </mc:Choice>
-        <mc:Fallback>
+        <mc:Fallback xmlns="">
           <p:sp>
             <p:nvSpPr>
               <p:cNvPr id="2" name="TextBox 1">
@@ -9766,8 +9708,8 @@
           </p:sp>
         </mc:Fallback>
       </mc:AlternateContent>
-      <mc:AlternateContent xmlns:mc="http://schemas.openxmlformats.org/markup-compatibility/2006">
-        <mc:Choice xmlns:a14="http://schemas.microsoft.com/office/drawing/2010/main" Requires="a14">
+      <mc:AlternateContent xmlns:mc="http://schemas.openxmlformats.org/markup-compatibility/2006" xmlns:a14="http://schemas.microsoft.com/office/drawing/2010/main">
+        <mc:Choice Requires="a14">
           <p:sp>
             <p:nvSpPr>
               <p:cNvPr id="3" name="TextBox 2">
@@ -9831,7 +9773,7 @@
             </p:txBody>
           </p:sp>
         </mc:Choice>
-        <mc:Fallback>
+        <mc:Fallback xmlns="">
           <p:sp>
             <p:nvSpPr>
               <p:cNvPr id="3" name="TextBox 2">
@@ -9876,8 +9818,8 @@
           </p:sp>
         </mc:Fallback>
       </mc:AlternateContent>
-      <mc:AlternateContent xmlns:mc="http://schemas.openxmlformats.org/markup-compatibility/2006">
-        <mc:Choice xmlns:a14="http://schemas.microsoft.com/office/drawing/2010/main" Requires="a14">
+      <mc:AlternateContent xmlns:mc="http://schemas.openxmlformats.org/markup-compatibility/2006" xmlns:a14="http://schemas.microsoft.com/office/drawing/2010/main">
+        <mc:Choice Requires="a14">
           <p:sp>
             <p:nvSpPr>
               <p:cNvPr id="6" name="TextBox 5">
@@ -9941,7 +9883,7 @@
             </p:txBody>
           </p:sp>
         </mc:Choice>
-        <mc:Fallback>
+        <mc:Fallback xmlns="">
           <p:sp>
             <p:nvSpPr>
               <p:cNvPr id="6" name="TextBox 5">
@@ -9986,8 +9928,8 @@
           </p:sp>
         </mc:Fallback>
       </mc:AlternateContent>
-      <mc:AlternateContent xmlns:mc="http://schemas.openxmlformats.org/markup-compatibility/2006">
-        <mc:Choice xmlns:a14="http://schemas.microsoft.com/office/drawing/2010/main" Requires="a14">
+      <mc:AlternateContent xmlns:mc="http://schemas.openxmlformats.org/markup-compatibility/2006" xmlns:a14="http://schemas.microsoft.com/office/drawing/2010/main">
+        <mc:Choice Requires="a14">
           <p:sp>
             <p:nvSpPr>
               <p:cNvPr id="10" name="TextBox 9">
@@ -10051,7 +9993,7 @@
             </p:txBody>
           </p:sp>
         </mc:Choice>
-        <mc:Fallback>
+        <mc:Fallback xmlns="">
           <p:sp>
             <p:nvSpPr>
               <p:cNvPr id="10" name="TextBox 9">

</xml_diff>